<commit_message>
Added the title slides for each chapter with publications as footers
</commit_message>
<xml_diff>
--- a/presentation/Defense.pptx
+++ b/presentation/Defense.pptx
@@ -16,8 +16,8 @@
     <p:sldId id="280" r:id="rId7"/>
     <p:sldId id="281" r:id="rId8"/>
     <p:sldId id="282" r:id="rId9"/>
-    <p:sldId id="283" r:id="rId10"/>
-    <p:sldId id="284" r:id="rId11"/>
+    <p:sldId id="292" r:id="rId10"/>
+    <p:sldId id="293" r:id="rId11"/>
     <p:sldId id="285" r:id="rId12"/>
     <p:sldId id="286" r:id="rId13"/>
     <p:sldId id="287" r:id="rId14"/>
@@ -150,12 +150,12 @@
         </p14:section>
         <p14:section name="Multi-Target Regression" id="{C9B2E4F9-EC6A-284C-8EBA-A9F1148651F2}">
           <p14:sldIdLst>
-            <p14:sldId id="283"/>
+            <p14:sldId id="292"/>
           </p14:sldIdLst>
         </p14:section>
         <p14:section name="Multi-Instance Classification" id="{D48AD9B0-C469-CB45-A05C-5D59E0056BCE}">
           <p14:sldIdLst>
-            <p14:sldId id="284"/>
+            <p14:sldId id="293"/>
           </p14:sldIdLst>
         </p14:section>
         <p14:section name="Online Learning" id="{0037C51F-6019-2A42-8448-8C9F3D610977}">
@@ -821,6 +821,221 @@
           <a:bodyPr/>
           <a:lstStyle/>
           <a:p>
+            <a:pPr marL="0" marR="0" lvl="0" indent="0" algn="l" defTabSz="914400" rtl="0" eaLnBrk="1" fontAlgn="auto" latinLnBrk="0" hangingPunct="1">
+              <a:lnSpc>
+                <a:spcPct val="100000"/>
+              </a:lnSpc>
+              <a:spcBef>
+                <a:spcPts val="0"/>
+              </a:spcBef>
+              <a:spcAft>
+                <a:spcPts val="0"/>
+              </a:spcAft>
+              <a:buClrTx/>
+              <a:buSzTx/>
+              <a:buFontTx/>
+              <a:buNone/>
+              <a:tabLst/>
+              <a:defRPr/>
+            </a:pPr>
+            <a:r>
+              <a:rPr lang="en-US" dirty="0"/>
+              <a:t>G. Melki et al. “Multi-target support vector regression via correlation regressor chains”. Information Sciences, vol. 415, pp. 53–69, 2017.</a:t>
+            </a:r>
+          </a:p>
+          <a:p>
+            <a:endParaRPr lang="en-US" dirty="0"/>
+          </a:p>
+        </p:txBody>
+      </p:sp>
+      <p:sp>
+        <p:nvSpPr>
+          <p:cNvPr id="4" name="Slide Number Placeholder 3"/>
+          <p:cNvSpPr>
+            <a:spLocks noGrp="1"/>
+          </p:cNvSpPr>
+          <p:nvPr>
+            <p:ph type="sldNum" sz="quarter" idx="5"/>
+          </p:nvPr>
+        </p:nvSpPr>
+        <p:spPr/>
+        <p:txBody>
+          <a:bodyPr/>
+          <a:lstStyle/>
+          <a:p>
+            <a:fld id="{66651876-69CE-944D-BB5F-C8369DB2AA2E}" type="slidenum">
+              <a:rPr lang="en-US" smtClean="0"/>
+              <a:t>9</a:t>
+            </a:fld>
+            <a:endParaRPr lang="en-US"/>
+          </a:p>
+        </p:txBody>
+      </p:sp>
+    </p:spTree>
+    <p:extLst>
+      <p:ext uri="{BB962C8B-B14F-4D97-AF65-F5344CB8AC3E}">
+        <p14:creationId xmlns:p14="http://schemas.microsoft.com/office/powerpoint/2010/main" val="1341494270"/>
+      </p:ext>
+    </p:extLst>
+  </p:cSld>
+  <p:clrMapOvr>
+    <a:masterClrMapping/>
+  </p:clrMapOvr>
+</p:notes>
+</file>
+
+<file path=ppt/notesSlides/notesSlide4.xml><?xml version="1.0" encoding="utf-8"?>
+<p:notes xmlns:a="http://schemas.openxmlformats.org/drawingml/2006/main" xmlns:r="http://schemas.openxmlformats.org/officeDocument/2006/relationships" xmlns:p="http://schemas.openxmlformats.org/presentationml/2006/main">
+  <p:cSld>
+    <p:spTree>
+      <p:nvGrpSpPr>
+        <p:cNvPr id="1" name=""/>
+        <p:cNvGrpSpPr/>
+        <p:nvPr/>
+      </p:nvGrpSpPr>
+      <p:grpSpPr>
+        <a:xfrm>
+          <a:off x="0" y="0"/>
+          <a:ext cx="0" cy="0"/>
+          <a:chOff x="0" y="0"/>
+          <a:chExt cx="0" cy="0"/>
+        </a:xfrm>
+      </p:grpSpPr>
+      <p:sp>
+        <p:nvSpPr>
+          <p:cNvPr id="2" name="Slide Image Placeholder 1"/>
+          <p:cNvSpPr>
+            <a:spLocks noGrp="1" noRot="1" noChangeAspect="1"/>
+          </p:cNvSpPr>
+          <p:nvPr>
+            <p:ph type="sldImg"/>
+          </p:nvPr>
+        </p:nvSpPr>
+        <p:spPr/>
+      </p:sp>
+      <p:sp>
+        <p:nvSpPr>
+          <p:cNvPr id="3" name="Notes Placeholder 2"/>
+          <p:cNvSpPr>
+            <a:spLocks noGrp="1"/>
+          </p:cNvSpPr>
+          <p:nvPr>
+            <p:ph type="body" idx="1"/>
+          </p:nvPr>
+        </p:nvSpPr>
+        <p:spPr/>
+        <p:txBody>
+          <a:bodyPr/>
+          <a:lstStyle/>
+          <a:p>
+            <a:pPr marL="0" marR="0" lvl="0" indent="0" algn="l" defTabSz="914400" rtl="0" eaLnBrk="1" fontAlgn="auto" latinLnBrk="0" hangingPunct="1">
+              <a:lnSpc>
+                <a:spcPct val="100000"/>
+              </a:lnSpc>
+              <a:spcBef>
+                <a:spcPts val="0"/>
+              </a:spcBef>
+              <a:spcAft>
+                <a:spcPts val="0"/>
+              </a:spcAft>
+              <a:buClrTx/>
+              <a:buSzTx/>
+              <a:buFontTx/>
+              <a:buNone/>
+              <a:tabLst/>
+              <a:defRPr/>
+            </a:pPr>
+            <a:r>
+              <a:rPr lang="en-US" sz="800" dirty="0"/>
+              <a:t>G. Melki, A. Cano, and S. Ventura. “MIRSVM: Multi-Instance Support Vector Machine with Bag Representatives”. Pattern Recognition, vol. 79, 228-241, 2018.</a:t>
+            </a:r>
+            <a:endParaRPr lang="en-US" sz="600" dirty="0"/>
+          </a:p>
+          <a:p>
+            <a:endParaRPr lang="en-US" dirty="0"/>
+          </a:p>
+        </p:txBody>
+      </p:sp>
+      <p:sp>
+        <p:nvSpPr>
+          <p:cNvPr id="4" name="Slide Number Placeholder 3"/>
+          <p:cNvSpPr>
+            <a:spLocks noGrp="1"/>
+          </p:cNvSpPr>
+          <p:nvPr>
+            <p:ph type="sldNum" sz="quarter" idx="5"/>
+          </p:nvPr>
+        </p:nvSpPr>
+        <p:spPr/>
+        <p:txBody>
+          <a:bodyPr/>
+          <a:lstStyle/>
+          <a:p>
+            <a:fld id="{66651876-69CE-944D-BB5F-C8369DB2AA2E}" type="slidenum">
+              <a:rPr lang="en-US" smtClean="0"/>
+              <a:t>10</a:t>
+            </a:fld>
+            <a:endParaRPr lang="en-US"/>
+          </a:p>
+        </p:txBody>
+      </p:sp>
+    </p:spTree>
+    <p:extLst>
+      <p:ext uri="{BB962C8B-B14F-4D97-AF65-F5344CB8AC3E}">
+        <p14:creationId xmlns:p14="http://schemas.microsoft.com/office/powerpoint/2010/main" val="2159855159"/>
+      </p:ext>
+    </p:extLst>
+  </p:cSld>
+  <p:clrMapOvr>
+    <a:masterClrMapping/>
+  </p:clrMapOvr>
+</p:notes>
+</file>
+
+<file path=ppt/notesSlides/notesSlide5.xml><?xml version="1.0" encoding="utf-8"?>
+<p:notes xmlns:a="http://schemas.openxmlformats.org/drawingml/2006/main" xmlns:r="http://schemas.openxmlformats.org/officeDocument/2006/relationships" xmlns:p="http://schemas.openxmlformats.org/presentationml/2006/main">
+  <p:cSld>
+    <p:spTree>
+      <p:nvGrpSpPr>
+        <p:cNvPr id="1" name=""/>
+        <p:cNvGrpSpPr/>
+        <p:nvPr/>
+      </p:nvGrpSpPr>
+      <p:grpSpPr>
+        <a:xfrm>
+          <a:off x="0" y="0"/>
+          <a:ext cx="0" cy="0"/>
+          <a:chOff x="0" y="0"/>
+          <a:chExt cx="0" cy="0"/>
+        </a:xfrm>
+      </p:grpSpPr>
+      <p:sp>
+        <p:nvSpPr>
+          <p:cNvPr id="2" name="Slide Image Placeholder 1"/>
+          <p:cNvSpPr>
+            <a:spLocks noGrp="1" noRot="1" noChangeAspect="1"/>
+          </p:cNvSpPr>
+          <p:nvPr>
+            <p:ph type="sldImg"/>
+          </p:nvPr>
+        </p:nvSpPr>
+        <p:spPr/>
+      </p:sp>
+      <p:sp>
+        <p:nvSpPr>
+          <p:cNvPr id="3" name="Notes Placeholder 2"/>
+          <p:cNvSpPr>
+            <a:spLocks noGrp="1"/>
+          </p:cNvSpPr>
+          <p:nvPr>
+            <p:ph type="body" idx="1"/>
+          </p:nvPr>
+        </p:nvSpPr>
+        <p:spPr/>
+        <p:txBody>
+          <a:bodyPr/>
+          <a:lstStyle/>
+          <a:p>
             <a:endParaRPr lang="en-US" dirty="0"/>
           </a:p>
         </p:txBody>
@@ -1294,24 +1509,42 @@
       </p:sp>
       <p:sp>
         <p:nvSpPr>
-          <p:cNvPr id="5" name="Footer Placeholder 4">
-            <a:extLst>
-              <a:ext uri="{FF2B5EF4-FFF2-40B4-BE49-F238E27FC236}">
-                <a16:creationId xmlns:a16="http://schemas.microsoft.com/office/drawing/2014/main" id="{83CC7164-237B-084A-95A3-79505A70A006}"/>
-              </a:ext>
-            </a:extLst>
-          </p:cNvPr>
-          <p:cNvSpPr>
-            <a:spLocks noGrp="1"/>
-          </p:cNvSpPr>
-          <p:nvPr>
-            <p:ph type="ftr" sz="quarter" idx="11"/>
-          </p:nvPr>
-        </p:nvSpPr>
-        <p:spPr/>
-        <p:txBody>
-          <a:bodyPr/>
-          <a:lstStyle/>
+          <p:cNvPr id="10" name="Footer Placeholder 4">
+            <a:extLst>
+              <a:ext uri="{FF2B5EF4-FFF2-40B4-BE49-F238E27FC236}">
+                <a16:creationId xmlns:a16="http://schemas.microsoft.com/office/drawing/2014/main" id="{39220069-AD37-1F40-B017-D2DB1E32AEAD}"/>
+              </a:ext>
+            </a:extLst>
+          </p:cNvPr>
+          <p:cNvSpPr>
+            <a:spLocks noGrp="1"/>
+          </p:cNvSpPr>
+          <p:nvPr>
+            <p:ph type="ftr" sz="quarter" idx="3"/>
+          </p:nvPr>
+        </p:nvSpPr>
+        <p:spPr>
+          <a:xfrm>
+            <a:off x="3411415" y="4958378"/>
+            <a:ext cx="3086100" cy="167052"/>
+          </a:xfrm>
+          <a:prstGeom prst="rect">
+            <a:avLst/>
+          </a:prstGeom>
+        </p:spPr>
+        <p:txBody>
+          <a:bodyPr vert="horz" lIns="91440" tIns="45720" rIns="91440" bIns="45720" rtlCol="0" anchor="ctr"/>
+          <a:lstStyle>
+            <a:lvl1pPr algn="l">
+              <a:defRPr sz="700">
+                <a:solidFill>
+                  <a:srgbClr val="333333"/>
+                </a:solidFill>
+                <a:latin typeface="Arial" panose="020B0604020202020204" pitchFamily="34" charset="0"/>
+                <a:cs typeface="Arial" panose="020B0604020202020204" pitchFamily="34" charset="0"/>
+              </a:defRPr>
+            </a:lvl1pPr>
+          </a:lstStyle>
           <a:p>
             <a:endParaRPr lang="en-US" dirty="0"/>
           </a:p>
@@ -1319,30 +1552,49 @@
       </p:sp>
       <p:sp>
         <p:nvSpPr>
-          <p:cNvPr id="6" name="Slide Number Placeholder 5">
-            <a:extLst>
-              <a:ext uri="{FF2B5EF4-FFF2-40B4-BE49-F238E27FC236}">
-                <a16:creationId xmlns:a16="http://schemas.microsoft.com/office/drawing/2014/main" id="{E1F75915-656B-C24E-974F-DB47180ABD04}"/>
-              </a:ext>
-            </a:extLst>
-          </p:cNvPr>
-          <p:cNvSpPr>
-            <a:spLocks noGrp="1"/>
-          </p:cNvSpPr>
-          <p:nvPr>
-            <p:ph type="sldNum" sz="quarter" idx="12"/>
-          </p:nvPr>
-        </p:nvSpPr>
-        <p:spPr/>
-        <p:txBody>
-          <a:bodyPr/>
-          <a:lstStyle/>
+          <p:cNvPr id="11" name="Slide Number Placeholder 5">
+            <a:extLst>
+              <a:ext uri="{FF2B5EF4-FFF2-40B4-BE49-F238E27FC236}">
+                <a16:creationId xmlns:a16="http://schemas.microsoft.com/office/drawing/2014/main" id="{B430E94E-E64C-5141-B394-BF46A230CEED}"/>
+              </a:ext>
+            </a:extLst>
+          </p:cNvPr>
+          <p:cNvSpPr>
+            <a:spLocks noGrp="1"/>
+          </p:cNvSpPr>
+          <p:nvPr>
+            <p:ph type="sldNum" sz="quarter" idx="4"/>
+          </p:nvPr>
+        </p:nvSpPr>
+        <p:spPr>
+          <a:xfrm>
+            <a:off x="8537330" y="4958378"/>
+            <a:ext cx="431313" cy="167052"/>
+          </a:xfrm>
+          <a:prstGeom prst="rect">
+            <a:avLst/>
+          </a:prstGeom>
+        </p:spPr>
+        <p:txBody>
+          <a:bodyPr vert="horz" lIns="91440" tIns="45720" rIns="91440" bIns="45720" rtlCol="0" anchor="ctr"/>
+          <a:lstStyle>
+            <a:lvl1pPr algn="r">
+              <a:defRPr sz="700">
+                <a:solidFill>
+                  <a:srgbClr val="333333"/>
+                </a:solidFill>
+                <a:latin typeface="Arial" panose="020B0604020202020204" pitchFamily="34" charset="0"/>
+                <a:cs typeface="Arial" panose="020B0604020202020204" pitchFamily="34" charset="0"/>
+              </a:defRPr>
+            </a:lvl1pPr>
+          </a:lstStyle>
           <a:p>
             <a:fld id="{51F1AC64-B052-AA44-9FFA-523D4080C13E}" type="slidenum">
               <a:rPr lang="en-US" smtClean="0"/>
+              <a:pPr/>
               <a:t>‹#›</a:t>
             </a:fld>
-            <a:endParaRPr lang="en-US"/>
+            <a:endParaRPr lang="en-US" dirty="0"/>
           </a:p>
         </p:txBody>
       </p:sp>
@@ -1360,8 +1612,8 @@
 </file>
 
 <file path=ppt/slideLayouts/slideLayout3.xml><?xml version="1.0" encoding="utf-8"?>
-<p:sldLayout xmlns:a="http://schemas.openxmlformats.org/drawingml/2006/main" xmlns:r="http://schemas.openxmlformats.org/officeDocument/2006/relationships" xmlns:p="http://schemas.openxmlformats.org/presentationml/2006/main" type="twoObj" preserve="1">
-  <p:cSld name="Two Content">
+<p:sldLayout xmlns:a="http://schemas.openxmlformats.org/drawingml/2006/main" xmlns:r="http://schemas.openxmlformats.org/officeDocument/2006/relationships" xmlns:p="http://schemas.openxmlformats.org/presentationml/2006/main" preserve="1" userDrawn="1">
+  <p:cSld name="1_Title and Content">
     <p:spTree>
       <p:nvGrpSpPr>
         <p:cNvPr id="1" name=""/>
@@ -1381,7 +1633,7 @@
           <p:cNvPr id="2" name="Title 1">
             <a:extLst>
               <a:ext uri="{FF2B5EF4-FFF2-40B4-BE49-F238E27FC236}">
-                <a16:creationId xmlns:a16="http://schemas.microsoft.com/office/drawing/2014/main" id="{02381885-CFB0-394E-BED2-369724DE48B4}"/>
+                <a16:creationId xmlns:a16="http://schemas.microsoft.com/office/drawing/2014/main" id="{F80DD238-76CE-D44A-BF99-B94ECE99D64E}"/>
               </a:ext>
             </a:extLst>
           </p:cNvPr>
@@ -1394,8 +1646,8 @@
         </p:nvSpPr>
         <p:spPr>
           <a:xfrm>
-            <a:off x="628651" y="189563"/>
-            <a:ext cx="7886700" cy="620669"/>
+            <a:off x="628651" y="189560"/>
+            <a:ext cx="7886700" cy="643818"/>
           </a:xfrm>
           <a:prstGeom prst="rect">
             <a:avLst/>
@@ -1421,21 +1673,21 @@
           <p:cNvPr id="3" name="Content Placeholder 2">
             <a:extLst>
               <a:ext uri="{FF2B5EF4-FFF2-40B4-BE49-F238E27FC236}">
-                <a16:creationId xmlns:a16="http://schemas.microsoft.com/office/drawing/2014/main" id="{47D83AD7-D2A0-0F4C-885D-2BE400610745}"/>
-              </a:ext>
-            </a:extLst>
-          </p:cNvPr>
-          <p:cNvSpPr>
-            <a:spLocks noGrp="1"/>
-          </p:cNvSpPr>
-          <p:nvPr>
-            <p:ph sz="half" idx="1"/>
+                <a16:creationId xmlns:a16="http://schemas.microsoft.com/office/drawing/2014/main" id="{52612021-EE0B-1446-BA58-2AD03DEBD67C}"/>
+              </a:ext>
+            </a:extLst>
+          </p:cNvPr>
+          <p:cNvSpPr>
+            <a:spLocks noGrp="1"/>
+          </p:cNvSpPr>
+          <p:nvPr>
+            <p:ph idx="1"/>
           </p:nvPr>
         </p:nvSpPr>
         <p:spPr>
           <a:xfrm>
-            <a:off x="628651" y="945165"/>
-            <a:ext cx="3867151" cy="3687160"/>
+            <a:off x="628651" y="925975"/>
+            <a:ext cx="7886700" cy="3706350"/>
           </a:xfrm>
           <a:prstGeom prst="rect">
             <a:avLst/>
@@ -1529,23 +1781,141 @@
       </p:sp>
       <p:sp>
         <p:nvSpPr>
-          <p:cNvPr id="4" name="Content Placeholder 3">
-            <a:extLst>
-              <a:ext uri="{FF2B5EF4-FFF2-40B4-BE49-F238E27FC236}">
-                <a16:creationId xmlns:a16="http://schemas.microsoft.com/office/drawing/2014/main" id="{9E0E8E47-23A1-7B4F-98A3-C1AE40A65AF1}"/>
-              </a:ext>
-            </a:extLst>
-          </p:cNvPr>
-          <p:cNvSpPr>
-            <a:spLocks noGrp="1"/>
-          </p:cNvSpPr>
-          <p:nvPr>
-            <p:ph sz="half" idx="2"/>
+          <p:cNvPr id="11" name="Slide Number Placeholder 5">
+            <a:extLst>
+              <a:ext uri="{FF2B5EF4-FFF2-40B4-BE49-F238E27FC236}">
+                <a16:creationId xmlns:a16="http://schemas.microsoft.com/office/drawing/2014/main" id="{B430E94E-E64C-5141-B394-BF46A230CEED}"/>
+              </a:ext>
+            </a:extLst>
+          </p:cNvPr>
+          <p:cNvSpPr>
+            <a:spLocks noGrp="1"/>
+          </p:cNvSpPr>
+          <p:nvPr>
+            <p:ph type="sldNum" sz="quarter" idx="4"/>
           </p:nvPr>
         </p:nvSpPr>
         <p:spPr>
           <a:xfrm>
-            <a:off x="4648202" y="945165"/>
+            <a:off x="8537330" y="4958378"/>
+            <a:ext cx="431313" cy="167052"/>
+          </a:xfrm>
+          <a:prstGeom prst="rect">
+            <a:avLst/>
+          </a:prstGeom>
+        </p:spPr>
+        <p:txBody>
+          <a:bodyPr vert="horz" lIns="91440" tIns="45720" rIns="91440" bIns="45720" rtlCol="0" anchor="ctr"/>
+          <a:lstStyle>
+            <a:lvl1pPr algn="r">
+              <a:defRPr sz="700">
+                <a:solidFill>
+                  <a:srgbClr val="333333"/>
+                </a:solidFill>
+                <a:latin typeface="Arial" panose="020B0604020202020204" pitchFamily="34" charset="0"/>
+                <a:cs typeface="Arial" panose="020B0604020202020204" pitchFamily="34" charset="0"/>
+              </a:defRPr>
+            </a:lvl1pPr>
+          </a:lstStyle>
+          <a:p>
+            <a:fld id="{51F1AC64-B052-AA44-9FFA-523D4080C13E}" type="slidenum">
+              <a:rPr lang="en-US" smtClean="0"/>
+              <a:pPr/>
+              <a:t>‹#›</a:t>
+            </a:fld>
+            <a:endParaRPr lang="en-US" dirty="0"/>
+          </a:p>
+        </p:txBody>
+      </p:sp>
+    </p:spTree>
+    <p:extLst>
+      <p:ext uri="{BB962C8B-B14F-4D97-AF65-F5344CB8AC3E}">
+        <p14:creationId xmlns:p14="http://schemas.microsoft.com/office/powerpoint/2010/main" val="878610094"/>
+      </p:ext>
+    </p:extLst>
+  </p:cSld>
+  <p:clrMapOvr>
+    <a:masterClrMapping/>
+  </p:clrMapOvr>
+</p:sldLayout>
+</file>
+
+<file path=ppt/slideLayouts/slideLayout4.xml><?xml version="1.0" encoding="utf-8"?>
+<p:sldLayout xmlns:a="http://schemas.openxmlformats.org/drawingml/2006/main" xmlns:r="http://schemas.openxmlformats.org/officeDocument/2006/relationships" xmlns:p="http://schemas.openxmlformats.org/presentationml/2006/main" type="twoObj" preserve="1">
+  <p:cSld name="Two Content">
+    <p:spTree>
+      <p:nvGrpSpPr>
+        <p:cNvPr id="1" name=""/>
+        <p:cNvGrpSpPr/>
+        <p:nvPr/>
+      </p:nvGrpSpPr>
+      <p:grpSpPr>
+        <a:xfrm>
+          <a:off x="0" y="0"/>
+          <a:ext cx="0" cy="0"/>
+          <a:chOff x="0" y="0"/>
+          <a:chExt cx="0" cy="0"/>
+        </a:xfrm>
+      </p:grpSpPr>
+      <p:sp>
+        <p:nvSpPr>
+          <p:cNvPr id="2" name="Title 1">
+            <a:extLst>
+              <a:ext uri="{FF2B5EF4-FFF2-40B4-BE49-F238E27FC236}">
+                <a16:creationId xmlns:a16="http://schemas.microsoft.com/office/drawing/2014/main" id="{02381885-CFB0-394E-BED2-369724DE48B4}"/>
+              </a:ext>
+            </a:extLst>
+          </p:cNvPr>
+          <p:cNvSpPr>
+            <a:spLocks noGrp="1"/>
+          </p:cNvSpPr>
+          <p:nvPr>
+            <p:ph type="title"/>
+          </p:nvPr>
+        </p:nvSpPr>
+        <p:spPr>
+          <a:xfrm>
+            <a:off x="628651" y="189563"/>
+            <a:ext cx="7886700" cy="620669"/>
+          </a:xfrm>
+          <a:prstGeom prst="rect">
+            <a:avLst/>
+          </a:prstGeom>
+        </p:spPr>
+        <p:txBody>
+          <a:bodyPr/>
+          <a:lstStyle>
+            <a:lvl1pPr>
+              <a:defRPr sz="3200"/>
+            </a:lvl1pPr>
+          </a:lstStyle>
+          <a:p>
+            <a:r>
+              <a:rPr lang="en-US" dirty="0"/>
+              <a:t>Click to edit Master title style</a:t>
+            </a:r>
+          </a:p>
+        </p:txBody>
+      </p:sp>
+      <p:sp>
+        <p:nvSpPr>
+          <p:cNvPr id="3" name="Content Placeholder 2">
+            <a:extLst>
+              <a:ext uri="{FF2B5EF4-FFF2-40B4-BE49-F238E27FC236}">
+                <a16:creationId xmlns:a16="http://schemas.microsoft.com/office/drawing/2014/main" id="{47D83AD7-D2A0-0F4C-885D-2BE400610745}"/>
+              </a:ext>
+            </a:extLst>
+          </p:cNvPr>
+          <p:cNvSpPr>
+            <a:spLocks noGrp="1"/>
+          </p:cNvSpPr>
+          <p:nvPr>
+            <p:ph sz="half" idx="1"/>
+          </p:nvPr>
+        </p:nvSpPr>
+        <p:spPr>
+          <a:xfrm>
+            <a:off x="628651" y="945165"/>
             <a:ext cx="3867151" cy="3687160"/>
           </a:xfrm>
           <a:prstGeom prst="rect">
@@ -1640,228 +2010,24 @@
       </p:sp>
       <p:sp>
         <p:nvSpPr>
-          <p:cNvPr id="6" name="Footer Placeholder 5">
-            <a:extLst>
-              <a:ext uri="{FF2B5EF4-FFF2-40B4-BE49-F238E27FC236}">
-                <a16:creationId xmlns:a16="http://schemas.microsoft.com/office/drawing/2014/main" id="{4AA35A83-2C87-A04A-B1F7-53A72D76C1C4}"/>
-              </a:ext>
-            </a:extLst>
-          </p:cNvPr>
-          <p:cNvSpPr>
-            <a:spLocks noGrp="1"/>
-          </p:cNvSpPr>
-          <p:nvPr>
-            <p:ph type="ftr" sz="quarter" idx="11"/>
-          </p:nvPr>
-        </p:nvSpPr>
-        <p:spPr/>
-        <p:txBody>
-          <a:bodyPr/>
-          <a:lstStyle/>
-          <a:p>
-            <a:endParaRPr lang="en-US"/>
-          </a:p>
-        </p:txBody>
-      </p:sp>
-      <p:sp>
-        <p:nvSpPr>
-          <p:cNvPr id="7" name="Slide Number Placeholder 6">
-            <a:extLst>
-              <a:ext uri="{FF2B5EF4-FFF2-40B4-BE49-F238E27FC236}">
-                <a16:creationId xmlns:a16="http://schemas.microsoft.com/office/drawing/2014/main" id="{6422B406-F58C-FE4E-AD34-0D0CBA1C6E76}"/>
-              </a:ext>
-            </a:extLst>
-          </p:cNvPr>
-          <p:cNvSpPr>
-            <a:spLocks noGrp="1"/>
-          </p:cNvSpPr>
-          <p:nvPr>
-            <p:ph type="sldNum" sz="quarter" idx="12"/>
-          </p:nvPr>
-        </p:nvSpPr>
-        <p:spPr/>
-        <p:txBody>
-          <a:bodyPr/>
-          <a:lstStyle/>
-          <a:p>
-            <a:fld id="{51F1AC64-B052-AA44-9FFA-523D4080C13E}" type="slidenum">
-              <a:rPr lang="en-US" smtClean="0"/>
-              <a:t>‹#›</a:t>
-            </a:fld>
-            <a:endParaRPr lang="en-US"/>
-          </a:p>
-        </p:txBody>
-      </p:sp>
-    </p:spTree>
-    <p:extLst>
-      <p:ext uri="{BB962C8B-B14F-4D97-AF65-F5344CB8AC3E}">
-        <p14:creationId xmlns:p14="http://schemas.microsoft.com/office/powerpoint/2010/main" val="1074586771"/>
-      </p:ext>
-    </p:extLst>
-  </p:cSld>
-  <p:clrMapOvr>
-    <a:masterClrMapping/>
-  </p:clrMapOvr>
-</p:sldLayout>
-</file>
-
-<file path=ppt/slideLayouts/slideLayout4.xml><?xml version="1.0" encoding="utf-8"?>
-<p:sldLayout xmlns:a="http://schemas.openxmlformats.org/drawingml/2006/main" xmlns:r="http://schemas.openxmlformats.org/officeDocument/2006/relationships" xmlns:p="http://schemas.openxmlformats.org/presentationml/2006/main" type="twoTxTwoObj" preserve="1">
-  <p:cSld name="Comparison">
-    <p:spTree>
-      <p:nvGrpSpPr>
-        <p:cNvPr id="1" name=""/>
-        <p:cNvGrpSpPr/>
-        <p:nvPr/>
-      </p:nvGrpSpPr>
-      <p:grpSpPr>
-        <a:xfrm>
-          <a:off x="0" y="0"/>
-          <a:ext cx="0" cy="0"/>
-          <a:chOff x="0" y="0"/>
-          <a:chExt cx="0" cy="0"/>
-        </a:xfrm>
-      </p:grpSpPr>
-      <p:sp>
-        <p:nvSpPr>
-          <p:cNvPr id="2" name="Title 1">
-            <a:extLst>
-              <a:ext uri="{FF2B5EF4-FFF2-40B4-BE49-F238E27FC236}">
-                <a16:creationId xmlns:a16="http://schemas.microsoft.com/office/drawing/2014/main" id="{C2F2B042-94BC-5643-8B4A-154C31DCF3AC}"/>
-              </a:ext>
-            </a:extLst>
-          </p:cNvPr>
-          <p:cNvSpPr>
-            <a:spLocks noGrp="1"/>
-          </p:cNvSpPr>
-          <p:nvPr>
-            <p:ph type="title"/>
+          <p:cNvPr id="4" name="Content Placeholder 3">
+            <a:extLst>
+              <a:ext uri="{FF2B5EF4-FFF2-40B4-BE49-F238E27FC236}">
+                <a16:creationId xmlns:a16="http://schemas.microsoft.com/office/drawing/2014/main" id="{9E0E8E47-23A1-7B4F-98A3-C1AE40A65AF1}"/>
+              </a:ext>
+            </a:extLst>
+          </p:cNvPr>
+          <p:cNvSpPr>
+            <a:spLocks noGrp="1"/>
+          </p:cNvSpPr>
+          <p:nvPr>
+            <p:ph sz="half" idx="2"/>
           </p:nvPr>
         </p:nvSpPr>
         <p:spPr>
           <a:xfrm>
-            <a:off x="630239" y="207726"/>
-            <a:ext cx="7886700" cy="628187"/>
-          </a:xfrm>
-          <a:prstGeom prst="rect">
-            <a:avLst/>
-          </a:prstGeom>
-        </p:spPr>
-        <p:txBody>
-          <a:bodyPr/>
-          <a:lstStyle>
-            <a:lvl1pPr>
-              <a:defRPr sz="3200"/>
-            </a:lvl1pPr>
-          </a:lstStyle>
-          <a:p>
-            <a:r>
-              <a:rPr lang="en-US" dirty="0"/>
-              <a:t>Click to edit Master title style</a:t>
-            </a:r>
-          </a:p>
-        </p:txBody>
-      </p:sp>
-      <p:sp>
-        <p:nvSpPr>
-          <p:cNvPr id="3" name="Text Placeholder 2">
-            <a:extLst>
-              <a:ext uri="{FF2B5EF4-FFF2-40B4-BE49-F238E27FC236}">
-                <a16:creationId xmlns:a16="http://schemas.microsoft.com/office/drawing/2014/main" id="{CF0DF2B7-D033-9E4B-854C-0FA0DDFF1CC3}"/>
-              </a:ext>
-            </a:extLst>
-          </p:cNvPr>
-          <p:cNvSpPr>
-            <a:spLocks noGrp="1"/>
-          </p:cNvSpPr>
-          <p:nvPr>
-            <p:ph type="body" idx="1"/>
-          </p:nvPr>
-        </p:nvSpPr>
-        <p:spPr>
-          <a:xfrm>
-            <a:off x="630240" y="961322"/>
-            <a:ext cx="3868737" cy="404492"/>
-          </a:xfrm>
-          <a:prstGeom prst="rect">
-            <a:avLst/>
-          </a:prstGeom>
-        </p:spPr>
-        <p:txBody>
-          <a:bodyPr anchor="b"/>
-          <a:lstStyle>
-            <a:lvl1pPr marL="0" indent="0" algn="ctr">
-              <a:buNone/>
-              <a:defRPr sz="2000" b="1">
-                <a:solidFill>
-                  <a:srgbClr val="333333"/>
-                </a:solidFill>
-                <a:latin typeface="Arial" panose="020B0604020202020204" pitchFamily="34" charset="0"/>
-                <a:cs typeface="Arial" panose="020B0604020202020204" pitchFamily="34" charset="0"/>
-              </a:defRPr>
-            </a:lvl1pPr>
-            <a:lvl2pPr marL="457178" indent="0">
-              <a:buNone/>
-              <a:defRPr sz="2000" b="1"/>
-            </a:lvl2pPr>
-            <a:lvl3pPr marL="914354" indent="0">
-              <a:buNone/>
-              <a:defRPr sz="1800" b="1"/>
-            </a:lvl3pPr>
-            <a:lvl4pPr marL="1371532" indent="0">
-              <a:buNone/>
-              <a:defRPr sz="1600" b="1"/>
-            </a:lvl4pPr>
-            <a:lvl5pPr marL="1828709" indent="0">
-              <a:buNone/>
-              <a:defRPr sz="1600" b="1"/>
-            </a:lvl5pPr>
-            <a:lvl6pPr marL="2285886" indent="0">
-              <a:buNone/>
-              <a:defRPr sz="1600" b="1"/>
-            </a:lvl6pPr>
-            <a:lvl7pPr marL="2743062" indent="0">
-              <a:buNone/>
-              <a:defRPr sz="1600" b="1"/>
-            </a:lvl7pPr>
-            <a:lvl8pPr marL="3200240" indent="0">
-              <a:buNone/>
-              <a:defRPr sz="1600" b="1"/>
-            </a:lvl8pPr>
-            <a:lvl9pPr marL="3657418" indent="0">
-              <a:buNone/>
-              <a:defRPr sz="1600" b="1"/>
-            </a:lvl9pPr>
-          </a:lstStyle>
-          <a:p>
-            <a:pPr lvl="0"/>
-            <a:r>
-              <a:rPr lang="en-US" dirty="0"/>
-              <a:t>Edit Master text styles</a:t>
-            </a:r>
-          </a:p>
-        </p:txBody>
-      </p:sp>
-      <p:sp>
-        <p:nvSpPr>
-          <p:cNvPr id="4" name="Content Placeholder 3">
-            <a:extLst>
-              <a:ext uri="{FF2B5EF4-FFF2-40B4-BE49-F238E27FC236}">
-                <a16:creationId xmlns:a16="http://schemas.microsoft.com/office/drawing/2014/main" id="{0D1C5F8B-4603-F042-A472-5E6B551C254C}"/>
-              </a:ext>
-            </a:extLst>
-          </p:cNvPr>
-          <p:cNvSpPr>
-            <a:spLocks noGrp="1"/>
-          </p:cNvSpPr>
-          <p:nvPr>
-            <p:ph sz="half" idx="2"/>
-          </p:nvPr>
-        </p:nvSpPr>
-        <p:spPr>
-          <a:xfrm>
-            <a:off x="630241" y="1491226"/>
-            <a:ext cx="3868737" cy="3150624"/>
+            <a:off x="4648202" y="945165"/>
+            <a:ext cx="3867151" cy="3687160"/>
           </a:xfrm>
           <a:prstGeom prst="rect">
             <a:avLst/>
@@ -1955,24 +2121,148 @@
       </p:sp>
       <p:sp>
         <p:nvSpPr>
-          <p:cNvPr id="5" name="Text Placeholder 4">
-            <a:extLst>
-              <a:ext uri="{FF2B5EF4-FFF2-40B4-BE49-F238E27FC236}">
-                <a16:creationId xmlns:a16="http://schemas.microsoft.com/office/drawing/2014/main" id="{0B584A1F-D5C3-5541-8D40-0D1B72A9B8BC}"/>
-              </a:ext>
-            </a:extLst>
-          </p:cNvPr>
-          <p:cNvSpPr>
-            <a:spLocks noGrp="1"/>
-          </p:cNvSpPr>
-          <p:nvPr>
-            <p:ph type="body" sz="quarter" idx="3"/>
+          <p:cNvPr id="6" name="Footer Placeholder 5">
+            <a:extLst>
+              <a:ext uri="{FF2B5EF4-FFF2-40B4-BE49-F238E27FC236}">
+                <a16:creationId xmlns:a16="http://schemas.microsoft.com/office/drawing/2014/main" id="{4AA35A83-2C87-A04A-B1F7-53A72D76C1C4}"/>
+              </a:ext>
+            </a:extLst>
+          </p:cNvPr>
+          <p:cNvSpPr>
+            <a:spLocks noGrp="1"/>
+          </p:cNvSpPr>
+          <p:nvPr>
+            <p:ph type="ftr" sz="quarter" idx="11"/>
+          </p:nvPr>
+        </p:nvSpPr>
+        <p:spPr/>
+        <p:txBody>
+          <a:bodyPr/>
+          <a:lstStyle/>
+          <a:p>
+            <a:endParaRPr lang="en-US"/>
+          </a:p>
+        </p:txBody>
+      </p:sp>
+      <p:sp>
+        <p:nvSpPr>
+          <p:cNvPr id="7" name="Slide Number Placeholder 6">
+            <a:extLst>
+              <a:ext uri="{FF2B5EF4-FFF2-40B4-BE49-F238E27FC236}">
+                <a16:creationId xmlns:a16="http://schemas.microsoft.com/office/drawing/2014/main" id="{6422B406-F58C-FE4E-AD34-0D0CBA1C6E76}"/>
+              </a:ext>
+            </a:extLst>
+          </p:cNvPr>
+          <p:cNvSpPr>
+            <a:spLocks noGrp="1"/>
+          </p:cNvSpPr>
+          <p:nvPr>
+            <p:ph type="sldNum" sz="quarter" idx="12"/>
+          </p:nvPr>
+        </p:nvSpPr>
+        <p:spPr/>
+        <p:txBody>
+          <a:bodyPr/>
+          <a:lstStyle/>
+          <a:p>
+            <a:fld id="{51F1AC64-B052-AA44-9FFA-523D4080C13E}" type="slidenum">
+              <a:rPr lang="en-US" smtClean="0"/>
+              <a:t>‹#›</a:t>
+            </a:fld>
+            <a:endParaRPr lang="en-US"/>
+          </a:p>
+        </p:txBody>
+      </p:sp>
+    </p:spTree>
+    <p:extLst>
+      <p:ext uri="{BB962C8B-B14F-4D97-AF65-F5344CB8AC3E}">
+        <p14:creationId xmlns:p14="http://schemas.microsoft.com/office/powerpoint/2010/main" val="1074586771"/>
+      </p:ext>
+    </p:extLst>
+  </p:cSld>
+  <p:clrMapOvr>
+    <a:masterClrMapping/>
+  </p:clrMapOvr>
+</p:sldLayout>
+</file>
+
+<file path=ppt/slideLayouts/slideLayout5.xml><?xml version="1.0" encoding="utf-8"?>
+<p:sldLayout xmlns:a="http://schemas.openxmlformats.org/drawingml/2006/main" xmlns:r="http://schemas.openxmlformats.org/officeDocument/2006/relationships" xmlns:p="http://schemas.openxmlformats.org/presentationml/2006/main" type="twoTxTwoObj" preserve="1">
+  <p:cSld name="Comparison">
+    <p:spTree>
+      <p:nvGrpSpPr>
+        <p:cNvPr id="1" name=""/>
+        <p:cNvGrpSpPr/>
+        <p:nvPr/>
+      </p:nvGrpSpPr>
+      <p:grpSpPr>
+        <a:xfrm>
+          <a:off x="0" y="0"/>
+          <a:ext cx="0" cy="0"/>
+          <a:chOff x="0" y="0"/>
+          <a:chExt cx="0" cy="0"/>
+        </a:xfrm>
+      </p:grpSpPr>
+      <p:sp>
+        <p:nvSpPr>
+          <p:cNvPr id="2" name="Title 1">
+            <a:extLst>
+              <a:ext uri="{FF2B5EF4-FFF2-40B4-BE49-F238E27FC236}">
+                <a16:creationId xmlns:a16="http://schemas.microsoft.com/office/drawing/2014/main" id="{C2F2B042-94BC-5643-8B4A-154C31DCF3AC}"/>
+              </a:ext>
+            </a:extLst>
+          </p:cNvPr>
+          <p:cNvSpPr>
+            <a:spLocks noGrp="1"/>
+          </p:cNvSpPr>
+          <p:nvPr>
+            <p:ph type="title"/>
           </p:nvPr>
         </p:nvSpPr>
         <p:spPr>
           <a:xfrm>
-            <a:off x="4629151" y="961323"/>
-            <a:ext cx="3887788" cy="404492"/>
+            <a:off x="630239" y="207726"/>
+            <a:ext cx="7886700" cy="628187"/>
+          </a:xfrm>
+          <a:prstGeom prst="rect">
+            <a:avLst/>
+          </a:prstGeom>
+        </p:spPr>
+        <p:txBody>
+          <a:bodyPr/>
+          <a:lstStyle>
+            <a:lvl1pPr>
+              <a:defRPr sz="3200"/>
+            </a:lvl1pPr>
+          </a:lstStyle>
+          <a:p>
+            <a:r>
+              <a:rPr lang="en-US" dirty="0"/>
+              <a:t>Click to edit Master title style</a:t>
+            </a:r>
+          </a:p>
+        </p:txBody>
+      </p:sp>
+      <p:sp>
+        <p:nvSpPr>
+          <p:cNvPr id="3" name="Text Placeholder 2">
+            <a:extLst>
+              <a:ext uri="{FF2B5EF4-FFF2-40B4-BE49-F238E27FC236}">
+                <a16:creationId xmlns:a16="http://schemas.microsoft.com/office/drawing/2014/main" id="{CF0DF2B7-D033-9E4B-854C-0FA0DDFF1CC3}"/>
+              </a:ext>
+            </a:extLst>
+          </p:cNvPr>
+          <p:cNvSpPr>
+            <a:spLocks noGrp="1"/>
+          </p:cNvSpPr>
+          <p:nvPr>
+            <p:ph type="body" idx="1"/>
+          </p:nvPr>
+        </p:nvSpPr>
+        <p:spPr>
+          <a:xfrm>
+            <a:off x="630240" y="961322"/>
+            <a:ext cx="3868737" cy="404492"/>
           </a:xfrm>
           <a:prstGeom prst="rect">
             <a:avLst/>
@@ -2035,24 +2325,24 @@
       </p:sp>
       <p:sp>
         <p:nvSpPr>
-          <p:cNvPr id="6" name="Content Placeholder 5">
-            <a:extLst>
-              <a:ext uri="{FF2B5EF4-FFF2-40B4-BE49-F238E27FC236}">
-                <a16:creationId xmlns:a16="http://schemas.microsoft.com/office/drawing/2014/main" id="{5EC5DF5D-FAA4-DB47-990B-07180CAEACD8}"/>
-              </a:ext>
-            </a:extLst>
-          </p:cNvPr>
-          <p:cNvSpPr>
-            <a:spLocks noGrp="1"/>
-          </p:cNvSpPr>
-          <p:nvPr>
-            <p:ph sz="quarter" idx="4"/>
+          <p:cNvPr id="4" name="Content Placeholder 3">
+            <a:extLst>
+              <a:ext uri="{FF2B5EF4-FFF2-40B4-BE49-F238E27FC236}">
+                <a16:creationId xmlns:a16="http://schemas.microsoft.com/office/drawing/2014/main" id="{0D1C5F8B-4603-F042-A472-5E6B551C254C}"/>
+              </a:ext>
+            </a:extLst>
+          </p:cNvPr>
+          <p:cNvSpPr>
+            <a:spLocks noGrp="1"/>
+          </p:cNvSpPr>
+          <p:nvPr>
+            <p:ph sz="half" idx="2"/>
           </p:nvPr>
         </p:nvSpPr>
         <p:spPr>
           <a:xfrm>
-            <a:off x="4629151" y="1491226"/>
-            <a:ext cx="3887788" cy="3150624"/>
+            <a:off x="630241" y="1491226"/>
+            <a:ext cx="3868737" cy="3150624"/>
           </a:xfrm>
           <a:prstGeom prst="rect">
             <a:avLst/>
@@ -2146,26 +2436,231 @@
       </p:sp>
       <p:sp>
         <p:nvSpPr>
-          <p:cNvPr id="8" name="Footer Placeholder 7">
-            <a:extLst>
-              <a:ext uri="{FF2B5EF4-FFF2-40B4-BE49-F238E27FC236}">
-                <a16:creationId xmlns:a16="http://schemas.microsoft.com/office/drawing/2014/main" id="{A27B3AAF-F17E-3940-9B9D-72FA7D3419C5}"/>
-              </a:ext>
-            </a:extLst>
-          </p:cNvPr>
-          <p:cNvSpPr>
-            <a:spLocks noGrp="1"/>
-          </p:cNvSpPr>
-          <p:nvPr>
-            <p:ph type="ftr" sz="quarter" idx="11"/>
-          </p:nvPr>
-        </p:nvSpPr>
-        <p:spPr/>
+          <p:cNvPr id="5" name="Text Placeholder 4">
+            <a:extLst>
+              <a:ext uri="{FF2B5EF4-FFF2-40B4-BE49-F238E27FC236}">
+                <a16:creationId xmlns:a16="http://schemas.microsoft.com/office/drawing/2014/main" id="{0B584A1F-D5C3-5541-8D40-0D1B72A9B8BC}"/>
+              </a:ext>
+            </a:extLst>
+          </p:cNvPr>
+          <p:cNvSpPr>
+            <a:spLocks noGrp="1"/>
+          </p:cNvSpPr>
+          <p:nvPr>
+            <p:ph type="body" sz="quarter" idx="3"/>
+          </p:nvPr>
+        </p:nvSpPr>
+        <p:spPr>
+          <a:xfrm>
+            <a:off x="4629151" y="961323"/>
+            <a:ext cx="3887788" cy="404492"/>
+          </a:xfrm>
+          <a:prstGeom prst="rect">
+            <a:avLst/>
+          </a:prstGeom>
+        </p:spPr>
+        <p:txBody>
+          <a:bodyPr anchor="b"/>
+          <a:lstStyle>
+            <a:lvl1pPr marL="0" indent="0" algn="ctr">
+              <a:buNone/>
+              <a:defRPr sz="2000" b="1">
+                <a:solidFill>
+                  <a:srgbClr val="333333"/>
+                </a:solidFill>
+                <a:latin typeface="Arial" panose="020B0604020202020204" pitchFamily="34" charset="0"/>
+                <a:cs typeface="Arial" panose="020B0604020202020204" pitchFamily="34" charset="0"/>
+              </a:defRPr>
+            </a:lvl1pPr>
+            <a:lvl2pPr marL="457178" indent="0">
+              <a:buNone/>
+              <a:defRPr sz="2000" b="1"/>
+            </a:lvl2pPr>
+            <a:lvl3pPr marL="914354" indent="0">
+              <a:buNone/>
+              <a:defRPr sz="1800" b="1"/>
+            </a:lvl3pPr>
+            <a:lvl4pPr marL="1371532" indent="0">
+              <a:buNone/>
+              <a:defRPr sz="1600" b="1"/>
+            </a:lvl4pPr>
+            <a:lvl5pPr marL="1828709" indent="0">
+              <a:buNone/>
+              <a:defRPr sz="1600" b="1"/>
+            </a:lvl5pPr>
+            <a:lvl6pPr marL="2285886" indent="0">
+              <a:buNone/>
+              <a:defRPr sz="1600" b="1"/>
+            </a:lvl6pPr>
+            <a:lvl7pPr marL="2743062" indent="0">
+              <a:buNone/>
+              <a:defRPr sz="1600" b="1"/>
+            </a:lvl7pPr>
+            <a:lvl8pPr marL="3200240" indent="0">
+              <a:buNone/>
+              <a:defRPr sz="1600" b="1"/>
+            </a:lvl8pPr>
+            <a:lvl9pPr marL="3657418" indent="0">
+              <a:buNone/>
+              <a:defRPr sz="1600" b="1"/>
+            </a:lvl9pPr>
+          </a:lstStyle>
+          <a:p>
+            <a:pPr lvl="0"/>
+            <a:r>
+              <a:rPr lang="en-US" dirty="0"/>
+              <a:t>Edit Master text styles</a:t>
+            </a:r>
+          </a:p>
+        </p:txBody>
+      </p:sp>
+      <p:sp>
+        <p:nvSpPr>
+          <p:cNvPr id="6" name="Content Placeholder 5">
+            <a:extLst>
+              <a:ext uri="{FF2B5EF4-FFF2-40B4-BE49-F238E27FC236}">
+                <a16:creationId xmlns:a16="http://schemas.microsoft.com/office/drawing/2014/main" id="{5EC5DF5D-FAA4-DB47-990B-07180CAEACD8}"/>
+              </a:ext>
+            </a:extLst>
+          </p:cNvPr>
+          <p:cNvSpPr>
+            <a:spLocks noGrp="1"/>
+          </p:cNvSpPr>
+          <p:nvPr>
+            <p:ph sz="quarter" idx="4"/>
+          </p:nvPr>
+        </p:nvSpPr>
+        <p:spPr>
+          <a:xfrm>
+            <a:off x="4629151" y="1491226"/>
+            <a:ext cx="3887788" cy="3150624"/>
+          </a:xfrm>
+          <a:prstGeom prst="rect">
+            <a:avLst/>
+          </a:prstGeom>
+        </p:spPr>
         <p:txBody>
           <a:bodyPr/>
           <a:lstStyle>
             <a:lvl1pPr>
-              <a:defRPr sz="1000"/>
+              <a:defRPr sz="2000">
+                <a:solidFill>
+                  <a:srgbClr val="333333"/>
+                </a:solidFill>
+                <a:latin typeface="Arial" panose="020B0604020202020204" pitchFamily="34" charset="0"/>
+                <a:cs typeface="Arial" panose="020B0604020202020204" pitchFamily="34" charset="0"/>
+              </a:defRPr>
+            </a:lvl1pPr>
+            <a:lvl2pPr>
+              <a:defRPr sz="1800">
+                <a:solidFill>
+                  <a:srgbClr val="333333"/>
+                </a:solidFill>
+                <a:latin typeface="Arial" panose="020B0604020202020204" pitchFamily="34" charset="0"/>
+                <a:cs typeface="Arial" panose="020B0604020202020204" pitchFamily="34" charset="0"/>
+              </a:defRPr>
+            </a:lvl2pPr>
+            <a:lvl3pPr>
+              <a:defRPr sz="1600">
+                <a:solidFill>
+                  <a:srgbClr val="333333"/>
+                </a:solidFill>
+                <a:latin typeface="Arial" panose="020B0604020202020204" pitchFamily="34" charset="0"/>
+                <a:cs typeface="Arial" panose="020B0604020202020204" pitchFamily="34" charset="0"/>
+              </a:defRPr>
+            </a:lvl3pPr>
+            <a:lvl4pPr>
+              <a:defRPr sz="1400">
+                <a:solidFill>
+                  <a:srgbClr val="333333"/>
+                </a:solidFill>
+                <a:latin typeface="Arial" panose="020B0604020202020204" pitchFamily="34" charset="0"/>
+                <a:cs typeface="Arial" panose="020B0604020202020204" pitchFamily="34" charset="0"/>
+              </a:defRPr>
+            </a:lvl4pPr>
+            <a:lvl5pPr>
+              <a:defRPr sz="1400">
+                <a:solidFill>
+                  <a:srgbClr val="333333"/>
+                </a:solidFill>
+                <a:latin typeface="Arial" panose="020B0604020202020204" pitchFamily="34" charset="0"/>
+                <a:cs typeface="Arial" panose="020B0604020202020204" pitchFamily="34" charset="0"/>
+              </a:defRPr>
+            </a:lvl5pPr>
+          </a:lstStyle>
+          <a:p>
+            <a:pPr lvl="0"/>
+            <a:r>
+              <a:rPr lang="en-US" dirty="0"/>
+              <a:t>Edit Master text styles</a:t>
+            </a:r>
+          </a:p>
+          <a:p>
+            <a:pPr lvl="1"/>
+            <a:r>
+              <a:rPr lang="en-US" dirty="0"/>
+              <a:t>Second level</a:t>
+            </a:r>
+          </a:p>
+          <a:p>
+            <a:pPr lvl="2"/>
+            <a:r>
+              <a:rPr lang="en-US" dirty="0"/>
+              <a:t>Third level</a:t>
+            </a:r>
+          </a:p>
+          <a:p>
+            <a:pPr lvl="3"/>
+            <a:r>
+              <a:rPr lang="en-US" dirty="0"/>
+              <a:t>Fourth level</a:t>
+            </a:r>
+          </a:p>
+          <a:p>
+            <a:pPr lvl="4"/>
+            <a:r>
+              <a:rPr lang="en-US" dirty="0"/>
+              <a:t>Fifth level</a:t>
+            </a:r>
+          </a:p>
+        </p:txBody>
+      </p:sp>
+      <p:sp>
+        <p:nvSpPr>
+          <p:cNvPr id="10" name="Footer Placeholder 4">
+            <a:extLst>
+              <a:ext uri="{FF2B5EF4-FFF2-40B4-BE49-F238E27FC236}">
+                <a16:creationId xmlns:a16="http://schemas.microsoft.com/office/drawing/2014/main" id="{2037FA78-48CA-0948-AAF4-1A0B72A2403B}"/>
+              </a:ext>
+            </a:extLst>
+          </p:cNvPr>
+          <p:cNvSpPr>
+            <a:spLocks noGrp="1"/>
+          </p:cNvSpPr>
+          <p:nvPr>
+            <p:ph type="ftr" sz="quarter" idx="10"/>
+          </p:nvPr>
+        </p:nvSpPr>
+        <p:spPr>
+          <a:xfrm>
+            <a:off x="3411415" y="4958378"/>
+            <a:ext cx="3086100" cy="167052"/>
+          </a:xfrm>
+          <a:prstGeom prst="rect">
+            <a:avLst/>
+          </a:prstGeom>
+        </p:spPr>
+        <p:txBody>
+          <a:bodyPr vert="horz" lIns="91440" tIns="45720" rIns="91440" bIns="45720" rtlCol="0" anchor="ctr"/>
+          <a:lstStyle>
+            <a:lvl1pPr algn="l">
+              <a:defRPr sz="700">
+                <a:solidFill>
+                  <a:srgbClr val="333333"/>
+                </a:solidFill>
+                <a:latin typeface="Arial" panose="020B0604020202020204" pitchFamily="34" charset="0"/>
+                <a:cs typeface="Arial" panose="020B0604020202020204" pitchFamily="34" charset="0"/>
+              </a:defRPr>
             </a:lvl1pPr>
           </a:lstStyle>
           <a:p>
@@ -2175,26 +2670,40 @@
       </p:sp>
       <p:sp>
         <p:nvSpPr>
-          <p:cNvPr id="9" name="Slide Number Placeholder 8">
-            <a:extLst>
-              <a:ext uri="{FF2B5EF4-FFF2-40B4-BE49-F238E27FC236}">
-                <a16:creationId xmlns:a16="http://schemas.microsoft.com/office/drawing/2014/main" id="{037028B8-10A1-5B47-91AA-BFAF0ADA0AAD}"/>
-              </a:ext>
-            </a:extLst>
-          </p:cNvPr>
-          <p:cNvSpPr>
-            <a:spLocks noGrp="1"/>
-          </p:cNvSpPr>
-          <p:nvPr>
-            <p:ph type="sldNum" sz="quarter" idx="12"/>
-          </p:nvPr>
-        </p:nvSpPr>
-        <p:spPr/>
-        <p:txBody>
-          <a:bodyPr/>
+          <p:cNvPr id="11" name="Slide Number Placeholder 5">
+            <a:extLst>
+              <a:ext uri="{FF2B5EF4-FFF2-40B4-BE49-F238E27FC236}">
+                <a16:creationId xmlns:a16="http://schemas.microsoft.com/office/drawing/2014/main" id="{B02666E8-78C6-8641-82A0-5AF5E9876697}"/>
+              </a:ext>
+            </a:extLst>
+          </p:cNvPr>
+          <p:cNvSpPr>
+            <a:spLocks noGrp="1"/>
+          </p:cNvSpPr>
+          <p:nvPr>
+            <p:ph type="sldNum" sz="quarter" idx="11"/>
+          </p:nvPr>
+        </p:nvSpPr>
+        <p:spPr>
+          <a:xfrm>
+            <a:off x="8537330" y="4958378"/>
+            <a:ext cx="431313" cy="167052"/>
+          </a:xfrm>
+          <a:prstGeom prst="rect">
+            <a:avLst/>
+          </a:prstGeom>
+        </p:spPr>
+        <p:txBody>
+          <a:bodyPr vert="horz" lIns="91440" tIns="45720" rIns="91440" bIns="45720" rtlCol="0" anchor="ctr"/>
           <a:lstStyle>
-            <a:lvl1pPr>
-              <a:defRPr sz="1000"/>
+            <a:lvl1pPr algn="r">
+              <a:defRPr sz="700">
+                <a:solidFill>
+                  <a:srgbClr val="333333"/>
+                </a:solidFill>
+                <a:latin typeface="Arial" panose="020B0604020202020204" pitchFamily="34" charset="0"/>
+                <a:cs typeface="Arial" panose="020B0604020202020204" pitchFamily="34" charset="0"/>
+              </a:defRPr>
             </a:lvl1pPr>
           </a:lstStyle>
           <a:p>
@@ -2220,7 +2729,7 @@
 </p:sldLayout>
 </file>
 
-<file path=ppt/slideLayouts/slideLayout5.xml><?xml version="1.0" encoding="utf-8"?>
+<file path=ppt/slideLayouts/slideLayout6.xml><?xml version="1.0" encoding="utf-8"?>
 <p:sldLayout xmlns:a="http://schemas.openxmlformats.org/drawingml/2006/main" xmlns:r="http://schemas.openxmlformats.org/officeDocument/2006/relationships" xmlns:p="http://schemas.openxmlformats.org/presentationml/2006/main" type="title" preserve="1">
   <p:cSld name="-section slide">
     <p:spTree>
@@ -2408,7 +2917,7 @@
 </p:sldLayout>
 </file>
 
-<file path=ppt/slideLayouts/slideLayout6.xml><?xml version="1.0" encoding="utf-8"?>
+<file path=ppt/slideLayouts/slideLayout7.xml><?xml version="1.0" encoding="utf-8"?>
 <p:sldLayout xmlns:a="http://schemas.openxmlformats.org/drawingml/2006/main" xmlns:r="http://schemas.openxmlformats.org/officeDocument/2006/relationships" xmlns:p="http://schemas.openxmlformats.org/presentationml/2006/main" preserve="1" userDrawn="1">
   <p:cSld name="1_-section slide">
     <p:spTree>
@@ -2464,33 +2973,29 @@
       </p:sp>
       <p:sp>
         <p:nvSpPr>
-          <p:cNvPr id="5" name="Footer Placeholder 2">
-            <a:extLst>
-              <a:ext uri="{FF2B5EF4-FFF2-40B4-BE49-F238E27FC236}">
-                <a16:creationId xmlns:a16="http://schemas.microsoft.com/office/drawing/2014/main" id="{5872A636-2A4D-5843-985B-0F9806D20A27}"/>
-              </a:ext>
-            </a:extLst>
-          </p:cNvPr>
-          <p:cNvSpPr>
-            <a:spLocks noGrp="1"/>
-          </p:cNvSpPr>
-          <p:nvPr>
-            <p:ph type="ftr" sz="quarter" idx="11"/>
+          <p:cNvPr id="8" name="Footer Placeholder 2">
+            <a:extLst>
+              <a:ext uri="{FF2B5EF4-FFF2-40B4-BE49-F238E27FC236}">
+                <a16:creationId xmlns:a16="http://schemas.microsoft.com/office/drawing/2014/main" id="{3B7BEF71-51F3-C94C-92AE-CA48B1A6AB64}"/>
+              </a:ext>
+            </a:extLst>
+          </p:cNvPr>
+          <p:cNvSpPr>
+            <a:spLocks noGrp="1"/>
+          </p:cNvSpPr>
+          <p:nvPr>
+            <p:ph type="ftr" sz="quarter" idx="3"/>
           </p:nvPr>
         </p:nvSpPr>
         <p:spPr>
           <a:xfrm>
-            <a:off x="3546467" y="5001260"/>
-            <a:ext cx="5597533" cy="142240"/>
+            <a:off x="3330134" y="4897120"/>
+            <a:ext cx="5732585" cy="347980"/>
           </a:xfrm>
         </p:spPr>
         <p:txBody>
           <a:bodyPr/>
-          <a:lstStyle>
-            <a:lvl1pPr algn="l">
-              <a:defRPr sz="700"/>
-            </a:lvl1pPr>
-          </a:lstStyle>
+          <a:lstStyle/>
           <a:p>
             <a:endParaRPr lang="en-US" dirty="0"/>
           </a:p>
@@ -2552,8 +3057,8 @@
         </p:nvSpPr>
         <p:spPr>
           <a:xfrm>
-            <a:off x="3688707" y="4767266"/>
-            <a:ext cx="3086100" cy="274637"/>
+            <a:off x="3411415" y="4958378"/>
+            <a:ext cx="3086100" cy="167052"/>
           </a:xfrm>
           <a:prstGeom prst="rect">
             <a:avLst/>
@@ -2562,8 +3067,8 @@
         <p:txBody>
           <a:bodyPr vert="horz" lIns="91440" tIns="45720" rIns="91440" bIns="45720" rtlCol="0" anchor="ctr"/>
           <a:lstStyle>
-            <a:lvl1pPr algn="ctr">
-              <a:defRPr sz="1000">
+            <a:lvl1pPr algn="l">
+              <a:defRPr sz="700">
                 <a:solidFill>
                   <a:srgbClr val="333333"/>
                 </a:solidFill>
@@ -2595,8 +3100,8 @@
         </p:nvSpPr>
         <p:spPr>
           <a:xfrm>
-            <a:off x="6902451" y="4767267"/>
-            <a:ext cx="2057400" cy="274637"/>
+            <a:off x="8537330" y="4958378"/>
+            <a:ext cx="431313" cy="167052"/>
           </a:xfrm>
           <a:prstGeom prst="rect">
             <a:avLst/>
@@ -2606,7 +3111,7 @@
           <a:bodyPr vert="horz" lIns="91440" tIns="45720" rIns="91440" bIns="45720" rtlCol="0" anchor="ctr"/>
           <a:lstStyle>
             <a:lvl1pPr algn="r">
-              <a:defRPr sz="1000">
+              <a:defRPr sz="700">
                 <a:solidFill>
                   <a:srgbClr val="333333"/>
                 </a:solidFill>
@@ -2640,7 +3145,7 @@
           <p:nvPr userDrawn="1"/>
         </p:nvPicPr>
         <p:blipFill>
-          <a:blip r:embed="rId8">
+          <a:blip r:embed="rId9">
             <a:extLst>
               <a:ext uri="{28A0092B-C50C-407E-A947-70E740481C1C}">
                 <a14:useLocalDpi xmlns:a14="http://schemas.microsoft.com/office/drawing/2010/main" val="0"/>
@@ -2653,8 +3158,8 @@
         </p:blipFill>
         <p:spPr>
           <a:xfrm>
-            <a:off x="2" y="4616049"/>
-            <a:ext cx="3915294" cy="527449"/>
+            <a:off x="2" y="4683929"/>
+            <a:ext cx="3411413" cy="459569"/>
           </a:xfrm>
           <a:prstGeom prst="rect">
             <a:avLst/>
@@ -2679,12 +3184,13 @@
   <p:sldLayoutIdLst>
     <p:sldLayoutId id="2147483758" r:id="rId1"/>
     <p:sldLayoutId id="2147483759" r:id="rId2"/>
-    <p:sldLayoutId id="2147483761" r:id="rId3"/>
-    <p:sldLayoutId id="2147483762" r:id="rId4"/>
-    <p:sldLayoutId id="2147483763" r:id="rId5"/>
-    <p:sldLayoutId id="2147483764" r:id="rId6"/>
+    <p:sldLayoutId id="2147483765" r:id="rId3"/>
+    <p:sldLayoutId id="2147483761" r:id="rId4"/>
+    <p:sldLayoutId id="2147483762" r:id="rId5"/>
+    <p:sldLayoutId id="2147483763" r:id="rId6"/>
+    <p:sldLayoutId id="2147483764" r:id="rId7"/>
   </p:sldLayoutIdLst>
-  <p:hf sldNum="0" hdr="0" dt="0"/>
+  <p:hf hdr="0" dt="0"/>
   <p:txStyles>
     <p:titleStyle>
       <a:lvl1pPr algn="l" defTabSz="914354" rtl="0" eaLnBrk="1" latinLnBrk="0" hangingPunct="1">
@@ -3211,6 +3717,35 @@
           </a:p>
         </p:txBody>
       </p:sp>
+      <p:sp>
+        <p:nvSpPr>
+          <p:cNvPr id="10" name="Slide Number Placeholder 9">
+            <a:extLst>
+              <a:ext uri="{FF2B5EF4-FFF2-40B4-BE49-F238E27FC236}">
+                <a16:creationId xmlns:a16="http://schemas.microsoft.com/office/drawing/2014/main" id="{B5844590-51ED-F044-A6AD-456EC83A11E1}"/>
+              </a:ext>
+            </a:extLst>
+          </p:cNvPr>
+          <p:cNvSpPr>
+            <a:spLocks noGrp="1"/>
+          </p:cNvSpPr>
+          <p:nvPr>
+            <p:ph type="sldNum" sz="quarter" idx="12"/>
+          </p:nvPr>
+        </p:nvSpPr>
+        <p:spPr/>
+        <p:txBody>
+          <a:bodyPr/>
+          <a:lstStyle/>
+          <a:p>
+            <a:fld id="{51F1AC64-B052-AA44-9FFA-523D4080C13E}" type="slidenum">
+              <a:rPr lang="en-US" smtClean="0"/>
+              <a:t>1</a:t>
+            </a:fld>
+            <a:endParaRPr lang="en-US" dirty="0"/>
+          </a:p>
+        </p:txBody>
+      </p:sp>
     </p:spTree>
     <p:extLst>
       <p:ext uri="{BB962C8B-B14F-4D97-AF65-F5344CB8AC3E}">
@@ -3246,7 +3781,7 @@
           <p:cNvPr id="2" name="Title 1">
             <a:extLst>
               <a:ext uri="{FF2B5EF4-FFF2-40B4-BE49-F238E27FC236}">
-                <a16:creationId xmlns:a16="http://schemas.microsoft.com/office/drawing/2014/main" id="{4B42BF49-246B-8D44-BA06-7679FCB39BCF}"/>
+                <a16:creationId xmlns:a16="http://schemas.microsoft.com/office/drawing/2014/main" id="{E6A216D0-2943-CF46-8799-53340E80757C}"/>
               </a:ext>
             </a:extLst>
           </p:cNvPr>
@@ -3274,18 +3809,23 @@
           <p:cNvPr id="3" name="Footer Placeholder 2">
             <a:extLst>
               <a:ext uri="{FF2B5EF4-FFF2-40B4-BE49-F238E27FC236}">
-                <a16:creationId xmlns:a16="http://schemas.microsoft.com/office/drawing/2014/main" id="{496E9C80-93A1-C44A-B9FE-47364A24DCF9}"/>
-              </a:ext>
-            </a:extLst>
-          </p:cNvPr>
-          <p:cNvSpPr>
-            <a:spLocks noGrp="1"/>
-          </p:cNvSpPr>
-          <p:nvPr>
-            <p:ph type="ftr" sz="quarter" idx="11"/>
-          </p:nvPr>
-        </p:nvSpPr>
-        <p:spPr/>
+                <a16:creationId xmlns:a16="http://schemas.microsoft.com/office/drawing/2014/main" id="{848BEBCA-F34A-BB42-ABD3-D8F4AF87B879}"/>
+              </a:ext>
+            </a:extLst>
+          </p:cNvPr>
+          <p:cNvSpPr>
+            <a:spLocks noGrp="1"/>
+          </p:cNvSpPr>
+          <p:nvPr>
+            <p:ph type="ftr" sz="quarter" idx="3"/>
+          </p:nvPr>
+        </p:nvSpPr>
+        <p:spPr>
+          <a:xfrm>
+            <a:off x="3065974" y="4897120"/>
+            <a:ext cx="5732585" cy="347980"/>
+          </a:xfrm>
+        </p:spPr>
         <p:txBody>
           <a:bodyPr/>
           <a:lstStyle/>
@@ -3294,6 +3834,8 @@
               <a:rPr lang="en-US" dirty="0"/>
               <a:t>G. Melki et al. “MIRSVM: Multi-Instance Support Vector Machine with Bag Representatives”. Pattern Recognition, vol. 79, 228-241, 2018.</a:t>
             </a:r>
+          </a:p>
+          <a:p>
             <a:endParaRPr lang="en-US" sz="100" dirty="0"/>
           </a:p>
           <a:p>
@@ -3304,7 +3846,7 @@
     </p:spTree>
     <p:extLst>
       <p:ext uri="{BB962C8B-B14F-4D97-AF65-F5344CB8AC3E}">
-        <p14:creationId xmlns:p14="http://schemas.microsoft.com/office/powerpoint/2010/main" val="1287191448"/>
+        <p14:creationId xmlns:p14="http://schemas.microsoft.com/office/powerpoint/2010/main" val="1425177868"/>
       </p:ext>
     </p:extLst>
   </p:cSld>
@@ -3361,33 +3903,30 @@
       </p:sp>
       <p:sp>
         <p:nvSpPr>
-          <p:cNvPr id="5" name="Footer Placeholder 2">
-            <a:extLst>
-              <a:ext uri="{FF2B5EF4-FFF2-40B4-BE49-F238E27FC236}">
-                <a16:creationId xmlns:a16="http://schemas.microsoft.com/office/drawing/2014/main" id="{03C7F2E0-8BC0-EE4F-9397-59554E4B6927}"/>
-              </a:ext>
-            </a:extLst>
-          </p:cNvPr>
-          <p:cNvSpPr>
-            <a:spLocks noGrp="1"/>
-          </p:cNvSpPr>
-          <p:nvPr>
-            <p:ph type="ftr" sz="quarter" idx="11"/>
+          <p:cNvPr id="6" name="Footer Placeholder 2">
+            <a:extLst>
+              <a:ext uri="{FF2B5EF4-FFF2-40B4-BE49-F238E27FC236}">
+                <a16:creationId xmlns:a16="http://schemas.microsoft.com/office/drawing/2014/main" id="{F0A55CD4-C387-774F-8F3D-D5AAC79BC5EE}"/>
+              </a:ext>
+            </a:extLst>
+          </p:cNvPr>
+          <p:cNvSpPr>
+            <a:spLocks noGrp="1"/>
+          </p:cNvSpPr>
+          <p:nvPr>
+            <p:ph type="ftr" sz="quarter" idx="3"/>
           </p:nvPr>
         </p:nvSpPr>
         <p:spPr>
           <a:xfrm>
-            <a:off x="3546467" y="5001260"/>
-            <a:ext cx="5597533" cy="142240"/>
+            <a:off x="3065974" y="4897120"/>
+            <a:ext cx="5732585" cy="347980"/>
           </a:xfrm>
         </p:spPr>
         <p:txBody>
           <a:bodyPr/>
           <a:lstStyle/>
           <a:p>
-            <a:pPr lvl="0" defTabSz="914400">
-              <a:defRPr/>
-            </a:pPr>
             <a:r>
               <a:rPr lang="en-US" dirty="0"/>
               <a:t>G. Melki et al. “OLLAWV: </a:t>
@@ -3400,6 +3939,9 @@
               <a:rPr lang="en-US" dirty="0"/>
               <a:t> Learning Algorithm using Worst-Violators”. Applied Soft Computing, vol. 66, 384-393, 2018.</a:t>
             </a:r>
+          </a:p>
+          <a:p>
+            <a:endParaRPr lang="en-US" sz="100" dirty="0"/>
           </a:p>
           <a:p>
             <a:endParaRPr lang="en-US" dirty="0"/>
@@ -3560,14 +4102,54 @@
             <a:spLocks noGrp="1"/>
           </p:cNvSpPr>
           <p:nvPr>
-            <p:ph type="ftr" sz="quarter" idx="11"/>
-          </p:nvPr>
-        </p:nvSpPr>
-        <p:spPr/>
-        <p:txBody>
-          <a:bodyPr/>
-          <a:lstStyle/>
-          <a:p>
+            <p:ph type="ftr" sz="quarter" idx="3"/>
+          </p:nvPr>
+        </p:nvSpPr>
+        <p:spPr>
+          <a:xfrm>
+            <a:off x="3314633" y="4922056"/>
+            <a:ext cx="3086100" cy="168250"/>
+          </a:xfrm>
+        </p:spPr>
+        <p:txBody>
+          <a:bodyPr/>
+          <a:lstStyle/>
+          <a:p>
+            <a:endParaRPr lang="en-US" dirty="0"/>
+          </a:p>
+        </p:txBody>
+      </p:sp>
+      <p:sp>
+        <p:nvSpPr>
+          <p:cNvPr id="6" name="Slide Number Placeholder 5">
+            <a:extLst>
+              <a:ext uri="{FF2B5EF4-FFF2-40B4-BE49-F238E27FC236}">
+                <a16:creationId xmlns:a16="http://schemas.microsoft.com/office/drawing/2014/main" id="{A40EA513-9E9D-684C-AA1C-C31965BD6D7E}"/>
+              </a:ext>
+            </a:extLst>
+          </p:cNvPr>
+          <p:cNvSpPr>
+            <a:spLocks noGrp="1"/>
+          </p:cNvSpPr>
+          <p:nvPr>
+            <p:ph type="sldNum" sz="quarter" idx="4"/>
+          </p:nvPr>
+        </p:nvSpPr>
+        <p:spPr>
+          <a:xfrm>
+            <a:off x="6985579" y="4868863"/>
+            <a:ext cx="2057400" cy="274637"/>
+          </a:xfrm>
+        </p:spPr>
+        <p:txBody>
+          <a:bodyPr/>
+          <a:lstStyle/>
+          <a:p>
+            <a:fld id="{51F1AC64-B052-AA44-9FFA-523D4080C13E}" type="slidenum">
+              <a:rPr lang="en-US" smtClean="0"/>
+              <a:pPr/>
+              <a:t>13</a:t>
+            </a:fld>
             <a:endParaRPr lang="en-US" dirty="0"/>
           </a:p>
         </p:txBody>
@@ -3668,14 +4250,54 @@
             <a:spLocks noGrp="1"/>
           </p:cNvSpPr>
           <p:nvPr>
-            <p:ph type="ftr" sz="quarter" idx="11"/>
-          </p:nvPr>
-        </p:nvSpPr>
-        <p:spPr/>
-        <p:txBody>
-          <a:bodyPr/>
-          <a:lstStyle/>
-          <a:p>
+            <p:ph type="ftr" sz="quarter" idx="3"/>
+          </p:nvPr>
+        </p:nvSpPr>
+        <p:spPr>
+          <a:xfrm>
+            <a:off x="3314633" y="4922056"/>
+            <a:ext cx="3086100" cy="168250"/>
+          </a:xfrm>
+        </p:spPr>
+        <p:txBody>
+          <a:bodyPr/>
+          <a:lstStyle/>
+          <a:p>
+            <a:endParaRPr lang="en-US" dirty="0"/>
+          </a:p>
+        </p:txBody>
+      </p:sp>
+      <p:sp>
+        <p:nvSpPr>
+          <p:cNvPr id="6" name="Slide Number Placeholder 5">
+            <a:extLst>
+              <a:ext uri="{FF2B5EF4-FFF2-40B4-BE49-F238E27FC236}">
+                <a16:creationId xmlns:a16="http://schemas.microsoft.com/office/drawing/2014/main" id="{F289F857-3C15-1A44-BDC3-CC2AD1456528}"/>
+              </a:ext>
+            </a:extLst>
+          </p:cNvPr>
+          <p:cNvSpPr>
+            <a:spLocks noGrp="1"/>
+          </p:cNvSpPr>
+          <p:nvPr>
+            <p:ph type="sldNum" sz="quarter" idx="4"/>
+          </p:nvPr>
+        </p:nvSpPr>
+        <p:spPr>
+          <a:xfrm>
+            <a:off x="6985579" y="4868863"/>
+            <a:ext cx="2057400" cy="274637"/>
+          </a:xfrm>
+        </p:spPr>
+        <p:txBody>
+          <a:bodyPr/>
+          <a:lstStyle/>
+          <a:p>
+            <a:fld id="{51F1AC64-B052-AA44-9FFA-523D4080C13E}" type="slidenum">
+              <a:rPr lang="en-US" smtClean="0"/>
+              <a:pPr/>
+              <a:t>14</a:t>
+            </a:fld>
             <a:endParaRPr lang="en-US" dirty="0"/>
           </a:p>
         </p:txBody>
@@ -3945,6 +4567,71 @@
           </a:ln>
         </p:spPr>
       </p:pic>
+      <p:sp>
+        <p:nvSpPr>
+          <p:cNvPr id="10" name="Footer Placeholder 9">
+            <a:extLst>
+              <a:ext uri="{FF2B5EF4-FFF2-40B4-BE49-F238E27FC236}">
+                <a16:creationId xmlns:a16="http://schemas.microsoft.com/office/drawing/2014/main" id="{B97CDB82-450A-3641-95F4-57CB49B1D2D0}"/>
+              </a:ext>
+            </a:extLst>
+          </p:cNvPr>
+          <p:cNvSpPr>
+            <a:spLocks noGrp="1"/>
+          </p:cNvSpPr>
+          <p:nvPr>
+            <p:ph type="ftr" sz="quarter" idx="3"/>
+          </p:nvPr>
+        </p:nvSpPr>
+        <p:spPr>
+          <a:xfrm>
+            <a:off x="3314633" y="4922056"/>
+            <a:ext cx="3086100" cy="168250"/>
+          </a:xfrm>
+        </p:spPr>
+        <p:txBody>
+          <a:bodyPr/>
+          <a:lstStyle/>
+          <a:p>
+            <a:endParaRPr lang="en-US" dirty="0"/>
+          </a:p>
+        </p:txBody>
+      </p:sp>
+      <p:sp>
+        <p:nvSpPr>
+          <p:cNvPr id="11" name="Slide Number Placeholder 10">
+            <a:extLst>
+              <a:ext uri="{FF2B5EF4-FFF2-40B4-BE49-F238E27FC236}">
+                <a16:creationId xmlns:a16="http://schemas.microsoft.com/office/drawing/2014/main" id="{C650684D-8B65-894A-8794-0D1435C83EE7}"/>
+              </a:ext>
+            </a:extLst>
+          </p:cNvPr>
+          <p:cNvSpPr>
+            <a:spLocks noGrp="1"/>
+          </p:cNvSpPr>
+          <p:nvPr>
+            <p:ph type="sldNum" sz="quarter" idx="4"/>
+          </p:nvPr>
+        </p:nvSpPr>
+        <p:spPr>
+          <a:xfrm>
+            <a:off x="6985579" y="4868863"/>
+            <a:ext cx="2057400" cy="274637"/>
+          </a:xfrm>
+        </p:spPr>
+        <p:txBody>
+          <a:bodyPr/>
+          <a:lstStyle/>
+          <a:p>
+            <a:fld id="{51F1AC64-B052-AA44-9FFA-523D4080C13E}" type="slidenum">
+              <a:rPr lang="en-US" smtClean="0"/>
+              <a:pPr/>
+              <a:t>15</a:t>
+            </a:fld>
+            <a:endParaRPr lang="en-US" dirty="0"/>
+          </a:p>
+        </p:txBody>
+      </p:sp>
     </p:spTree>
     <p:extLst>
       <p:ext uri="{BB962C8B-B14F-4D97-AF65-F5344CB8AC3E}">
@@ -4341,6 +5028,71 @@
           </a:ln>
         </p:spPr>
       </p:pic>
+      <p:sp>
+        <p:nvSpPr>
+          <p:cNvPr id="17" name="Footer Placeholder 16">
+            <a:extLst>
+              <a:ext uri="{FF2B5EF4-FFF2-40B4-BE49-F238E27FC236}">
+                <a16:creationId xmlns:a16="http://schemas.microsoft.com/office/drawing/2014/main" id="{8655508C-F865-F44B-9B61-4146E0B23BD5}"/>
+              </a:ext>
+            </a:extLst>
+          </p:cNvPr>
+          <p:cNvSpPr>
+            <a:spLocks noGrp="1"/>
+          </p:cNvSpPr>
+          <p:nvPr>
+            <p:ph type="ftr" sz="quarter" idx="3"/>
+          </p:nvPr>
+        </p:nvSpPr>
+        <p:spPr>
+          <a:xfrm>
+            <a:off x="3314633" y="4922056"/>
+            <a:ext cx="3086100" cy="168250"/>
+          </a:xfrm>
+        </p:spPr>
+        <p:txBody>
+          <a:bodyPr/>
+          <a:lstStyle/>
+          <a:p>
+            <a:endParaRPr lang="en-US" dirty="0"/>
+          </a:p>
+        </p:txBody>
+      </p:sp>
+      <p:sp>
+        <p:nvSpPr>
+          <p:cNvPr id="18" name="Slide Number Placeholder 17">
+            <a:extLst>
+              <a:ext uri="{FF2B5EF4-FFF2-40B4-BE49-F238E27FC236}">
+                <a16:creationId xmlns:a16="http://schemas.microsoft.com/office/drawing/2014/main" id="{22F79D53-90FC-204C-8F13-4592FAE1FF41}"/>
+              </a:ext>
+            </a:extLst>
+          </p:cNvPr>
+          <p:cNvSpPr>
+            <a:spLocks noGrp="1"/>
+          </p:cNvSpPr>
+          <p:nvPr>
+            <p:ph type="sldNum" sz="quarter" idx="4"/>
+          </p:nvPr>
+        </p:nvSpPr>
+        <p:spPr>
+          <a:xfrm>
+            <a:off x="6985579" y="4868863"/>
+            <a:ext cx="2057400" cy="274637"/>
+          </a:xfrm>
+        </p:spPr>
+        <p:txBody>
+          <a:bodyPr/>
+          <a:lstStyle/>
+          <a:p>
+            <a:fld id="{51F1AC64-B052-AA44-9FFA-523D4080C13E}" type="slidenum">
+              <a:rPr lang="en-US" smtClean="0"/>
+              <a:pPr/>
+              <a:t>16</a:t>
+            </a:fld>
+            <a:endParaRPr lang="en-US" dirty="0"/>
+          </a:p>
+        </p:txBody>
+      </p:sp>
     </p:spTree>
     <p:extLst>
       <p:ext uri="{BB962C8B-B14F-4D97-AF65-F5344CB8AC3E}">
@@ -4431,25 +5183,35 @@
       </p:sp>
       <p:sp>
         <p:nvSpPr>
-          <p:cNvPr id="4" name="Footer Placeholder 3">
-            <a:extLst>
-              <a:ext uri="{FF2B5EF4-FFF2-40B4-BE49-F238E27FC236}">
-                <a16:creationId xmlns:a16="http://schemas.microsoft.com/office/drawing/2014/main" id="{E3D88ADD-7B0B-444D-8127-0DF5316F950E}"/>
-              </a:ext>
-            </a:extLst>
-          </p:cNvPr>
-          <p:cNvSpPr>
-            <a:spLocks noGrp="1"/>
-          </p:cNvSpPr>
-          <p:nvPr>
-            <p:ph type="ftr" sz="quarter" idx="11"/>
-          </p:nvPr>
-        </p:nvSpPr>
-        <p:spPr/>
-        <p:txBody>
-          <a:bodyPr/>
-          <a:lstStyle/>
-          <a:p>
+          <p:cNvPr id="7" name="Slide Number Placeholder 6">
+            <a:extLst>
+              <a:ext uri="{FF2B5EF4-FFF2-40B4-BE49-F238E27FC236}">
+                <a16:creationId xmlns:a16="http://schemas.microsoft.com/office/drawing/2014/main" id="{C6BF7974-725A-6E46-91CB-F5FBFB9E8457}"/>
+              </a:ext>
+            </a:extLst>
+          </p:cNvPr>
+          <p:cNvSpPr>
+            <a:spLocks noGrp="1"/>
+          </p:cNvSpPr>
+          <p:nvPr>
+            <p:ph type="sldNum" sz="quarter" idx="4"/>
+          </p:nvPr>
+        </p:nvSpPr>
+        <p:spPr>
+          <a:xfrm>
+            <a:off x="6985579" y="4868863"/>
+            <a:ext cx="2057400" cy="274637"/>
+          </a:xfrm>
+        </p:spPr>
+        <p:txBody>
+          <a:bodyPr/>
+          <a:lstStyle/>
+          <a:p>
+            <a:fld id="{51F1AC64-B052-AA44-9FFA-523D4080C13E}" type="slidenum">
+              <a:rPr lang="en-US" smtClean="0"/>
+              <a:pPr/>
+              <a:t>2</a:t>
+            </a:fld>
             <a:endParaRPr lang="en-US" dirty="0"/>
           </a:p>
         </p:txBody>
@@ -4539,25 +5301,35 @@
       </p:sp>
       <p:sp>
         <p:nvSpPr>
-          <p:cNvPr id="4" name="Footer Placeholder 3">
-            <a:extLst>
-              <a:ext uri="{FF2B5EF4-FFF2-40B4-BE49-F238E27FC236}">
-                <a16:creationId xmlns:a16="http://schemas.microsoft.com/office/drawing/2014/main" id="{CD0613FF-3684-324B-823F-23FA80381F81}"/>
-              </a:ext>
-            </a:extLst>
-          </p:cNvPr>
-          <p:cNvSpPr>
-            <a:spLocks noGrp="1"/>
-          </p:cNvSpPr>
-          <p:nvPr>
-            <p:ph type="ftr" sz="quarter" idx="11"/>
-          </p:nvPr>
-        </p:nvSpPr>
-        <p:spPr/>
-        <p:txBody>
-          <a:bodyPr/>
-          <a:lstStyle/>
-          <a:p>
+          <p:cNvPr id="7" name="Slide Number Placeholder 6">
+            <a:extLst>
+              <a:ext uri="{FF2B5EF4-FFF2-40B4-BE49-F238E27FC236}">
+                <a16:creationId xmlns:a16="http://schemas.microsoft.com/office/drawing/2014/main" id="{DB7025F4-CEEF-F444-9368-5C8B62BB288D}"/>
+              </a:ext>
+            </a:extLst>
+          </p:cNvPr>
+          <p:cNvSpPr>
+            <a:spLocks noGrp="1"/>
+          </p:cNvSpPr>
+          <p:nvPr>
+            <p:ph type="sldNum" sz="quarter" idx="4"/>
+          </p:nvPr>
+        </p:nvSpPr>
+        <p:spPr>
+          <a:xfrm>
+            <a:off x="6985579" y="4868863"/>
+            <a:ext cx="2057400" cy="274637"/>
+          </a:xfrm>
+        </p:spPr>
+        <p:txBody>
+          <a:bodyPr/>
+          <a:lstStyle/>
+          <a:p>
+            <a:fld id="{51F1AC64-B052-AA44-9FFA-523D4080C13E}" type="slidenum">
+              <a:rPr lang="en-US" smtClean="0"/>
+              <a:pPr/>
+              <a:t>3</a:t>
+            </a:fld>
             <a:endParaRPr lang="en-US" dirty="0"/>
           </a:p>
         </p:txBody>
@@ -4647,25 +5419,35 @@
       </p:sp>
       <p:sp>
         <p:nvSpPr>
-          <p:cNvPr id="4" name="Footer Placeholder 3">
-            <a:extLst>
-              <a:ext uri="{FF2B5EF4-FFF2-40B4-BE49-F238E27FC236}">
-                <a16:creationId xmlns:a16="http://schemas.microsoft.com/office/drawing/2014/main" id="{19759F80-2946-AC4C-8C75-C1678F3640CF}"/>
-              </a:ext>
-            </a:extLst>
-          </p:cNvPr>
-          <p:cNvSpPr>
-            <a:spLocks noGrp="1"/>
-          </p:cNvSpPr>
-          <p:nvPr>
-            <p:ph type="ftr" sz="quarter" idx="11"/>
-          </p:nvPr>
-        </p:nvSpPr>
-        <p:spPr/>
-        <p:txBody>
-          <a:bodyPr/>
-          <a:lstStyle/>
-          <a:p>
+          <p:cNvPr id="7" name="Slide Number Placeholder 6">
+            <a:extLst>
+              <a:ext uri="{FF2B5EF4-FFF2-40B4-BE49-F238E27FC236}">
+                <a16:creationId xmlns:a16="http://schemas.microsoft.com/office/drawing/2014/main" id="{000A392E-4422-6E46-B324-219E8B82D4D2}"/>
+              </a:ext>
+            </a:extLst>
+          </p:cNvPr>
+          <p:cNvSpPr>
+            <a:spLocks noGrp="1"/>
+          </p:cNvSpPr>
+          <p:nvPr>
+            <p:ph type="sldNum" sz="quarter" idx="4"/>
+          </p:nvPr>
+        </p:nvSpPr>
+        <p:spPr>
+          <a:xfrm>
+            <a:off x="6985579" y="4868863"/>
+            <a:ext cx="2057400" cy="274637"/>
+          </a:xfrm>
+        </p:spPr>
+        <p:txBody>
+          <a:bodyPr/>
+          <a:lstStyle/>
+          <a:p>
+            <a:fld id="{51F1AC64-B052-AA44-9FFA-523D4080C13E}" type="slidenum">
+              <a:rPr lang="en-US" smtClean="0"/>
+              <a:pPr/>
+              <a:t>4</a:t>
+            </a:fld>
             <a:endParaRPr lang="en-US" dirty="0"/>
           </a:p>
         </p:txBody>
@@ -4755,25 +5537,35 @@
       </p:sp>
       <p:sp>
         <p:nvSpPr>
-          <p:cNvPr id="4" name="Footer Placeholder 3">
-            <a:extLst>
-              <a:ext uri="{FF2B5EF4-FFF2-40B4-BE49-F238E27FC236}">
-                <a16:creationId xmlns:a16="http://schemas.microsoft.com/office/drawing/2014/main" id="{02B59D42-26FB-4A49-B809-E73C7E51FD5F}"/>
-              </a:ext>
-            </a:extLst>
-          </p:cNvPr>
-          <p:cNvSpPr>
-            <a:spLocks noGrp="1"/>
-          </p:cNvSpPr>
-          <p:nvPr>
-            <p:ph type="ftr" sz="quarter" idx="11"/>
-          </p:nvPr>
-        </p:nvSpPr>
-        <p:spPr/>
-        <p:txBody>
-          <a:bodyPr/>
-          <a:lstStyle/>
-          <a:p>
+          <p:cNvPr id="7" name="Slide Number Placeholder 6">
+            <a:extLst>
+              <a:ext uri="{FF2B5EF4-FFF2-40B4-BE49-F238E27FC236}">
+                <a16:creationId xmlns:a16="http://schemas.microsoft.com/office/drawing/2014/main" id="{FD50C986-F75E-C74A-A37A-4761CD57FA5B}"/>
+              </a:ext>
+            </a:extLst>
+          </p:cNvPr>
+          <p:cNvSpPr>
+            <a:spLocks noGrp="1"/>
+          </p:cNvSpPr>
+          <p:nvPr>
+            <p:ph type="sldNum" sz="quarter" idx="4"/>
+          </p:nvPr>
+        </p:nvSpPr>
+        <p:spPr>
+          <a:xfrm>
+            <a:off x="6985579" y="4868863"/>
+            <a:ext cx="2057400" cy="274637"/>
+          </a:xfrm>
+        </p:spPr>
+        <p:txBody>
+          <a:bodyPr/>
+          <a:lstStyle/>
+          <a:p>
+            <a:fld id="{51F1AC64-B052-AA44-9FFA-523D4080C13E}" type="slidenum">
+              <a:rPr lang="en-US" smtClean="0"/>
+              <a:pPr/>
+              <a:t>5</a:t>
+            </a:fld>
             <a:endParaRPr lang="en-US" dirty="0"/>
           </a:p>
         </p:txBody>
@@ -4863,25 +5655,35 @@
       </p:sp>
       <p:sp>
         <p:nvSpPr>
-          <p:cNvPr id="4" name="Footer Placeholder 3">
-            <a:extLst>
-              <a:ext uri="{FF2B5EF4-FFF2-40B4-BE49-F238E27FC236}">
-                <a16:creationId xmlns:a16="http://schemas.microsoft.com/office/drawing/2014/main" id="{75C34854-5567-AF48-9CD2-BBEEDD585995}"/>
-              </a:ext>
-            </a:extLst>
-          </p:cNvPr>
-          <p:cNvSpPr>
-            <a:spLocks noGrp="1"/>
-          </p:cNvSpPr>
-          <p:nvPr>
-            <p:ph type="ftr" sz="quarter" idx="11"/>
-          </p:nvPr>
-        </p:nvSpPr>
-        <p:spPr/>
-        <p:txBody>
-          <a:bodyPr/>
-          <a:lstStyle/>
-          <a:p>
+          <p:cNvPr id="7" name="Slide Number Placeholder 6">
+            <a:extLst>
+              <a:ext uri="{FF2B5EF4-FFF2-40B4-BE49-F238E27FC236}">
+                <a16:creationId xmlns:a16="http://schemas.microsoft.com/office/drawing/2014/main" id="{2CD15069-DA76-5346-AE2B-F15437A83905}"/>
+              </a:ext>
+            </a:extLst>
+          </p:cNvPr>
+          <p:cNvSpPr>
+            <a:spLocks noGrp="1"/>
+          </p:cNvSpPr>
+          <p:nvPr>
+            <p:ph type="sldNum" sz="quarter" idx="4"/>
+          </p:nvPr>
+        </p:nvSpPr>
+        <p:spPr>
+          <a:xfrm>
+            <a:off x="6985579" y="4868863"/>
+            <a:ext cx="2057400" cy="274637"/>
+          </a:xfrm>
+        </p:spPr>
+        <p:txBody>
+          <a:bodyPr/>
+          <a:lstStyle/>
+          <a:p>
+            <a:fld id="{51F1AC64-B052-AA44-9FFA-523D4080C13E}" type="slidenum">
+              <a:rPr lang="en-US" smtClean="0"/>
+              <a:pPr/>
+              <a:t>6</a:t>
+            </a:fld>
             <a:endParaRPr lang="en-US" dirty="0"/>
           </a:p>
         </p:txBody>
@@ -4982,14 +5784,54 @@
             <a:spLocks noGrp="1"/>
           </p:cNvSpPr>
           <p:nvPr>
-            <p:ph type="ftr" sz="quarter" idx="11"/>
-          </p:nvPr>
-        </p:nvSpPr>
-        <p:spPr/>
-        <p:txBody>
-          <a:bodyPr/>
-          <a:lstStyle/>
-          <a:p>
+            <p:ph type="ftr" sz="quarter" idx="3"/>
+          </p:nvPr>
+        </p:nvSpPr>
+        <p:spPr>
+          <a:xfrm>
+            <a:off x="3314633" y="4922056"/>
+            <a:ext cx="3086100" cy="168250"/>
+          </a:xfrm>
+        </p:spPr>
+        <p:txBody>
+          <a:bodyPr/>
+          <a:lstStyle/>
+          <a:p>
+            <a:endParaRPr lang="en-US" dirty="0"/>
+          </a:p>
+        </p:txBody>
+      </p:sp>
+      <p:sp>
+        <p:nvSpPr>
+          <p:cNvPr id="7" name="Slide Number Placeholder 6">
+            <a:extLst>
+              <a:ext uri="{FF2B5EF4-FFF2-40B4-BE49-F238E27FC236}">
+                <a16:creationId xmlns:a16="http://schemas.microsoft.com/office/drawing/2014/main" id="{0F7656FD-71B3-C44F-A153-D8A52909699A}"/>
+              </a:ext>
+            </a:extLst>
+          </p:cNvPr>
+          <p:cNvSpPr>
+            <a:spLocks noGrp="1"/>
+          </p:cNvSpPr>
+          <p:nvPr>
+            <p:ph type="sldNum" sz="quarter" idx="4"/>
+          </p:nvPr>
+        </p:nvSpPr>
+        <p:spPr>
+          <a:xfrm>
+            <a:off x="6985579" y="4868863"/>
+            <a:ext cx="2057400" cy="274637"/>
+          </a:xfrm>
+        </p:spPr>
+        <p:txBody>
+          <a:bodyPr/>
+          <a:lstStyle/>
+          <a:p>
+            <a:fld id="{51F1AC64-B052-AA44-9FFA-523D4080C13E}" type="slidenum">
+              <a:rPr lang="en-US" smtClean="0"/>
+              <a:pPr/>
+              <a:t>7</a:t>
+            </a:fld>
             <a:endParaRPr lang="en-US" dirty="0"/>
           </a:p>
         </p:txBody>
@@ -5090,14 +5932,54 @@
             <a:spLocks noGrp="1"/>
           </p:cNvSpPr>
           <p:nvPr>
-            <p:ph type="ftr" sz="quarter" idx="11"/>
-          </p:nvPr>
-        </p:nvSpPr>
-        <p:spPr/>
-        <p:txBody>
-          <a:bodyPr/>
-          <a:lstStyle/>
-          <a:p>
+            <p:ph type="ftr" sz="quarter" idx="3"/>
+          </p:nvPr>
+        </p:nvSpPr>
+        <p:spPr>
+          <a:xfrm>
+            <a:off x="3314633" y="4922056"/>
+            <a:ext cx="3086100" cy="168250"/>
+          </a:xfrm>
+        </p:spPr>
+        <p:txBody>
+          <a:bodyPr/>
+          <a:lstStyle/>
+          <a:p>
+            <a:endParaRPr lang="en-US" dirty="0"/>
+          </a:p>
+        </p:txBody>
+      </p:sp>
+      <p:sp>
+        <p:nvSpPr>
+          <p:cNvPr id="7" name="Slide Number Placeholder 6">
+            <a:extLst>
+              <a:ext uri="{FF2B5EF4-FFF2-40B4-BE49-F238E27FC236}">
+                <a16:creationId xmlns:a16="http://schemas.microsoft.com/office/drawing/2014/main" id="{81547D56-D31D-3D42-BA4D-05A84BB52FA6}"/>
+              </a:ext>
+            </a:extLst>
+          </p:cNvPr>
+          <p:cNvSpPr>
+            <a:spLocks noGrp="1"/>
+          </p:cNvSpPr>
+          <p:nvPr>
+            <p:ph type="sldNum" sz="quarter" idx="4"/>
+          </p:nvPr>
+        </p:nvSpPr>
+        <p:spPr>
+          <a:xfrm>
+            <a:off x="6985579" y="4868863"/>
+            <a:ext cx="2057400" cy="274637"/>
+          </a:xfrm>
+        </p:spPr>
+        <p:txBody>
+          <a:bodyPr/>
+          <a:lstStyle/>
+          <a:p>
+            <a:fld id="{51F1AC64-B052-AA44-9FFA-523D4080C13E}" type="slidenum">
+              <a:rPr lang="en-US" smtClean="0"/>
+              <a:pPr/>
+              <a:t>8</a:t>
+            </a:fld>
             <a:endParaRPr lang="en-US" dirty="0"/>
           </a:p>
         </p:txBody>
@@ -5137,7 +6019,7 @@
           <p:cNvPr id="2" name="Title 1">
             <a:extLst>
               <a:ext uri="{FF2B5EF4-FFF2-40B4-BE49-F238E27FC236}">
-                <a16:creationId xmlns:a16="http://schemas.microsoft.com/office/drawing/2014/main" id="{3F57F614-16C2-A047-9095-8C3B900A657C}"/>
+                <a16:creationId xmlns:a16="http://schemas.microsoft.com/office/drawing/2014/main" id="{61392269-56C8-B447-9059-11C0E3FA14F6}"/>
               </a:ext>
             </a:extLst>
           </p:cNvPr>
@@ -5162,45 +6044,50 @@
       </p:sp>
       <p:sp>
         <p:nvSpPr>
-          <p:cNvPr id="3" name="Footer Placeholder 2">
-            <a:extLst>
-              <a:ext uri="{FF2B5EF4-FFF2-40B4-BE49-F238E27FC236}">
-                <a16:creationId xmlns:a16="http://schemas.microsoft.com/office/drawing/2014/main" id="{D20B6FBD-9AF4-1D43-9961-D30C089178A3}"/>
-              </a:ext>
-            </a:extLst>
-          </p:cNvPr>
-          <p:cNvSpPr>
-            <a:spLocks noGrp="1"/>
-          </p:cNvSpPr>
-          <p:nvPr>
-            <p:ph type="ftr" sz="quarter" idx="11"/>
+          <p:cNvPr id="4" name="Footer Placeholder 2">
+            <a:extLst>
+              <a:ext uri="{FF2B5EF4-FFF2-40B4-BE49-F238E27FC236}">
+                <a16:creationId xmlns:a16="http://schemas.microsoft.com/office/drawing/2014/main" id="{835A8BB2-3539-9841-AF72-7131AFBDFC6B}"/>
+              </a:ext>
+            </a:extLst>
+          </p:cNvPr>
+          <p:cNvSpPr>
+            <a:spLocks noGrp="1"/>
+          </p:cNvSpPr>
+          <p:nvPr>
+            <p:ph type="ftr" sz="quarter" idx="3"/>
           </p:nvPr>
         </p:nvSpPr>
         <p:spPr>
           <a:xfrm>
-            <a:off x="3546467" y="5001260"/>
-            <a:ext cx="5597533" cy="142240"/>
+            <a:off x="3065974" y="4897120"/>
+            <a:ext cx="5732585" cy="347980"/>
           </a:xfrm>
         </p:spPr>
         <p:txBody>
           <a:bodyPr/>
           <a:lstStyle/>
           <a:p>
-            <a:pPr algn="l"/>
-            <a:r>
-              <a:rPr lang="en-US" sz="700" dirty="0"/>
+            <a:pPr lvl="0" defTabSz="914400">
+              <a:defRPr/>
+            </a:pPr>
+            <a:r>
+              <a:rPr lang="en-US" dirty="0"/>
               <a:t>G. Melki et al. “Multi-target support vector regression via correlation regressor chains”. Information Sciences, vol. 415, pp. 53–69, 2017.</a:t>
             </a:r>
           </a:p>
           <a:p>
-            <a:endParaRPr lang="en-US" sz="700" dirty="0"/>
+            <a:endParaRPr lang="en-US" sz="100" dirty="0"/>
+          </a:p>
+          <a:p>
+            <a:endParaRPr lang="en-US" dirty="0"/>
           </a:p>
         </p:txBody>
       </p:sp>
     </p:spTree>
     <p:extLst>
       <p:ext uri="{BB962C8B-B14F-4D97-AF65-F5344CB8AC3E}">
-        <p14:creationId xmlns:p14="http://schemas.microsoft.com/office/powerpoint/2010/main" val="3924376061"/>
+        <p14:creationId xmlns:p14="http://schemas.microsoft.com/office/powerpoint/2010/main" val="4165205983"/>
       </p:ext>
     </p:extLst>
   </p:cSld>

</xml_diff>